<commit_message>
work on 151 portfolio complete
</commit_message>
<xml_diff>
--- a/portfolio_midterm/151portfolio_midterm.pptx
+++ b/portfolio_midterm/151portfolio_midterm.pptx
@@ -5,24 +5,32 @@
     <p:sldMasterId id="2147483648" r:id="rId4"/>
   </p:sldMasterIdLst>
   <p:notesMasterIdLst>
-    <p:notesMasterId r:id="rId20"/>
+    <p:notesMasterId r:id="rId28"/>
   </p:notesMasterIdLst>
   <p:sldIdLst>
     <p:sldId id="530" r:id="rId5"/>
     <p:sldId id="531" r:id="rId6"/>
     <p:sldId id="547" r:id="rId7"/>
-    <p:sldId id="533" r:id="rId8"/>
-    <p:sldId id="538" r:id="rId9"/>
-    <p:sldId id="548" r:id="rId10"/>
-    <p:sldId id="550" r:id="rId11"/>
-    <p:sldId id="549" r:id="rId12"/>
-    <p:sldId id="551" r:id="rId13"/>
-    <p:sldId id="553" r:id="rId14"/>
-    <p:sldId id="552" r:id="rId15"/>
-    <p:sldId id="554" r:id="rId16"/>
-    <p:sldId id="555" r:id="rId17"/>
-    <p:sldId id="543" r:id="rId18"/>
-    <p:sldId id="544" r:id="rId19"/>
+    <p:sldId id="562" r:id="rId8"/>
+    <p:sldId id="563" r:id="rId9"/>
+    <p:sldId id="533" r:id="rId10"/>
+    <p:sldId id="538" r:id="rId11"/>
+    <p:sldId id="548" r:id="rId12"/>
+    <p:sldId id="550" r:id="rId13"/>
+    <p:sldId id="549" r:id="rId14"/>
+    <p:sldId id="551" r:id="rId15"/>
+    <p:sldId id="553" r:id="rId16"/>
+    <p:sldId id="552" r:id="rId17"/>
+    <p:sldId id="556" r:id="rId18"/>
+    <p:sldId id="554" r:id="rId19"/>
+    <p:sldId id="555" r:id="rId20"/>
+    <p:sldId id="557" r:id="rId21"/>
+    <p:sldId id="558" r:id="rId22"/>
+    <p:sldId id="559" r:id="rId23"/>
+    <p:sldId id="560" r:id="rId24"/>
+    <p:sldId id="561" r:id="rId25"/>
+    <p:sldId id="543" r:id="rId26"/>
+    <p:sldId id="544" r:id="rId27"/>
   </p:sldIdLst>
   <p:sldSz cx="12192000" cy="6858000"/>
   <p:notesSz cx="6858000" cy="9144000"/>
@@ -223,7 +231,7 @@
           <a:p>
             <a:fld id="{3F00BCFC-AFFD-334C-A183-6116BAFDF92B}" type="datetimeFigureOut">
               <a:rPr lang="en-US" smtClean="0"/>
-              <a:t>10/12/2024</a:t>
+              <a:t>11/24/2024</a:t>
             </a:fld>
             <a:endParaRPr lang="en-US" dirty="0"/>
           </a:p>
@@ -17184,6 +17192,434 @@
         <p:cNvPr id="1" name="">
           <a:extLst>
             <a:ext uri="{FF2B5EF4-FFF2-40B4-BE49-F238E27FC236}">
+              <a16:creationId xmlns:a16="http://schemas.microsoft.com/office/drawing/2014/main" id="{096E4B74-7D7C-6928-0B22-E8FF5A86FCF4}"/>
+            </a:ext>
+          </a:extLst>
+        </p:cNvPr>
+        <p:cNvGrpSpPr/>
+        <p:nvPr/>
+      </p:nvGrpSpPr>
+      <p:grpSpPr>
+        <a:xfrm>
+          <a:off x="0" y="0"/>
+          <a:ext cx="0" cy="0"/>
+          <a:chOff x="0" y="0"/>
+          <a:chExt cx="0" cy="0"/>
+        </a:xfrm>
+      </p:grpSpPr>
+      <p:sp>
+        <p:nvSpPr>
+          <p:cNvPr id="2" name="Title 1">
+            <a:extLst>
+              <a:ext uri="{FF2B5EF4-FFF2-40B4-BE49-F238E27FC236}">
+                <a16:creationId xmlns:a16="http://schemas.microsoft.com/office/drawing/2014/main" id="{095BD950-221D-B6DB-918A-9C88F3CFD60B}"/>
+              </a:ext>
+            </a:extLst>
+          </p:cNvPr>
+          <p:cNvSpPr>
+            <a:spLocks noGrp="1"/>
+          </p:cNvSpPr>
+          <p:nvPr>
+            <p:ph type="title"/>
+          </p:nvPr>
+        </p:nvSpPr>
+        <p:spPr>
+          <a:xfrm>
+            <a:off x="1231300" y="608076"/>
+            <a:ext cx="9167229" cy="1069848"/>
+          </a:xfrm>
+        </p:spPr>
+        <p:txBody>
+          <a:bodyPr/>
+          <a:lstStyle/>
+          <a:p>
+            <a:r>
+              <a:rPr lang="en-US" sz="3600" dirty="0"/>
+              <a:t>Project 03b: Utilizing </a:t>
+            </a:r>
+            <a:r>
+              <a:rPr lang="en-US" sz="3600" dirty="0" err="1"/>
+              <a:t>enums</a:t>
+            </a:r>
+            <a:endParaRPr lang="en-US" sz="3600" dirty="0"/>
+          </a:p>
+        </p:txBody>
+      </p:sp>
+      <p:sp>
+        <p:nvSpPr>
+          <p:cNvPr id="5" name="Text Placeholder 4">
+            <a:extLst>
+              <a:ext uri="{FF2B5EF4-FFF2-40B4-BE49-F238E27FC236}">
+                <a16:creationId xmlns:a16="http://schemas.microsoft.com/office/drawing/2014/main" id="{11B1C109-FCBB-309B-27EA-89AA8C076C58}"/>
+              </a:ext>
+            </a:extLst>
+          </p:cNvPr>
+          <p:cNvSpPr>
+            <a:spLocks noGrp="1"/>
+          </p:cNvSpPr>
+          <p:nvPr>
+            <p:ph type="body" sz="quarter" idx="3"/>
+          </p:nvPr>
+        </p:nvSpPr>
+        <p:spPr>
+          <a:xfrm>
+            <a:off x="1545336" y="2020824"/>
+            <a:ext cx="3621024" cy="493776"/>
+          </a:xfrm>
+        </p:spPr>
+        <p:txBody>
+          <a:bodyPr/>
+          <a:lstStyle/>
+          <a:p>
+            <a:r>
+              <a:rPr lang="en-US" dirty="0"/>
+              <a:t>Goals: </a:t>
+            </a:r>
+          </a:p>
+        </p:txBody>
+      </p:sp>
+      <p:sp>
+        <p:nvSpPr>
+          <p:cNvPr id="6" name="Content Placeholder 5">
+            <a:extLst>
+              <a:ext uri="{FF2B5EF4-FFF2-40B4-BE49-F238E27FC236}">
+                <a16:creationId xmlns:a16="http://schemas.microsoft.com/office/drawing/2014/main" id="{26664FC2-9C62-AFE7-F054-1346D6606EE6}"/>
+              </a:ext>
+            </a:extLst>
+          </p:cNvPr>
+          <p:cNvSpPr>
+            <a:spLocks noGrp="1"/>
+          </p:cNvSpPr>
+          <p:nvPr>
+            <p:ph sz="quarter" idx="4"/>
+          </p:nvPr>
+        </p:nvSpPr>
+        <p:spPr>
+          <a:xfrm>
+            <a:off x="1231300" y="2560319"/>
+            <a:ext cx="3621024" cy="2578608"/>
+          </a:xfrm>
+        </p:spPr>
+        <p:txBody>
+          <a:bodyPr/>
+          <a:lstStyle/>
+          <a:p>
+            <a:r>
+              <a:rPr lang="en-US" sz="1200" dirty="0"/>
+              <a:t>Properly define and utilize an </a:t>
+            </a:r>
+            <a:r>
+              <a:rPr lang="en-US" sz="1200" dirty="0" err="1"/>
+              <a:t>enum</a:t>
+            </a:r>
+            <a:r>
+              <a:rPr lang="en-US" sz="1200" dirty="0"/>
+              <a:t>.</a:t>
+            </a:r>
+          </a:p>
+          <a:p>
+            <a:pPr lvl="1"/>
+            <a:r>
+              <a:rPr lang="en-US" sz="1200" dirty="0"/>
+              <a:t>I created and use an ‘</a:t>
+            </a:r>
+            <a:r>
+              <a:rPr lang="en-US" sz="1200" dirty="0" err="1"/>
+              <a:t>enum</a:t>
+            </a:r>
+            <a:r>
+              <a:rPr lang="en-US" sz="1200" dirty="0"/>
+              <a:t>’ named Burgers, which contains multiple Burger types that are available.</a:t>
+            </a:r>
+          </a:p>
+          <a:p>
+            <a:r>
+              <a:rPr lang="en-US" sz="1200" dirty="0"/>
+              <a:t>I also use the Java ‘Scanner’ </a:t>
+            </a:r>
+          </a:p>
+          <a:p>
+            <a:pPr lvl="1"/>
+            <a:r>
+              <a:rPr lang="en-US" sz="1200" dirty="0"/>
+              <a:t>In my scanner I make certain it transforms the input into all uppercase to match my </a:t>
+            </a:r>
+            <a:r>
+              <a:rPr lang="en-US" sz="1200" dirty="0" err="1"/>
+              <a:t>enum</a:t>
+            </a:r>
+            <a:r>
+              <a:rPr lang="en-US" sz="1200" dirty="0"/>
+              <a:t> contents.</a:t>
+            </a:r>
+          </a:p>
+          <a:p>
+            <a:r>
+              <a:rPr lang="en-US" sz="1200" dirty="0"/>
+              <a:t>This project makes use of a ‘switch’ statement.</a:t>
+            </a:r>
+          </a:p>
+          <a:p>
+            <a:pPr lvl="1"/>
+            <a:endParaRPr lang="en-US" sz="1000" dirty="0"/>
+          </a:p>
+          <a:p>
+            <a:pPr lvl="1"/>
+            <a:endParaRPr lang="en-US" sz="1000" dirty="0"/>
+          </a:p>
+        </p:txBody>
+      </p:sp>
+      <p:pic>
+        <p:nvPicPr>
+          <p:cNvPr id="11" name="Picture 10" descr="A screenshot of a computer program&#10;&#10;Description automatically generated">
+            <a:extLst>
+              <a:ext uri="{FF2B5EF4-FFF2-40B4-BE49-F238E27FC236}">
+                <a16:creationId xmlns:a16="http://schemas.microsoft.com/office/drawing/2014/main" id="{B4F49C30-2F53-DCA0-FBA6-A23DB90529EE}"/>
+              </a:ext>
+            </a:extLst>
+          </p:cNvPr>
+          <p:cNvPicPr>
+            <a:picLocks noChangeAspect="1"/>
+          </p:cNvPicPr>
+          <p:nvPr/>
+        </p:nvPicPr>
+        <p:blipFill>
+          <a:blip r:embed="rId2"/>
+          <a:stretch>
+            <a:fillRect/>
+          </a:stretch>
+        </p:blipFill>
+        <p:spPr>
+          <a:xfrm>
+            <a:off x="5016875" y="1791853"/>
+            <a:ext cx="6978178" cy="4687455"/>
+          </a:xfrm>
+          <a:prstGeom prst="rect">
+            <a:avLst/>
+          </a:prstGeom>
+        </p:spPr>
+      </p:pic>
+    </p:spTree>
+    <p:extLst>
+      <p:ext uri="{BB962C8B-B14F-4D97-AF65-F5344CB8AC3E}">
+        <p14:creationId xmlns:p14="http://schemas.microsoft.com/office/powerpoint/2010/main" val="631271878"/>
+      </p:ext>
+    </p:extLst>
+  </p:cSld>
+  <p:clrMapOvr>
+    <a:masterClrMapping/>
+  </p:clrMapOvr>
+</p:sld>
+</file>
+
+<file path=ppt/slides/slide11.xml><?xml version="1.0" encoding="utf-8"?>
+<p:sld xmlns:a="http://schemas.openxmlformats.org/drawingml/2006/main" xmlns:r="http://schemas.openxmlformats.org/officeDocument/2006/relationships" xmlns:p="http://schemas.openxmlformats.org/presentationml/2006/main">
+  <p:cSld>
+    <p:spTree>
+      <p:nvGrpSpPr>
+        <p:cNvPr id="1" name="">
+          <a:extLst>
+            <a:ext uri="{FF2B5EF4-FFF2-40B4-BE49-F238E27FC236}">
+              <a16:creationId xmlns:a16="http://schemas.microsoft.com/office/drawing/2014/main" id="{7A7E5445-CA12-E946-C50E-821177B5FDD8}"/>
+            </a:ext>
+          </a:extLst>
+        </p:cNvPr>
+        <p:cNvGrpSpPr/>
+        <p:nvPr/>
+      </p:nvGrpSpPr>
+      <p:grpSpPr>
+        <a:xfrm>
+          <a:off x="0" y="0"/>
+          <a:ext cx="0" cy="0"/>
+          <a:chOff x="0" y="0"/>
+          <a:chExt cx="0" cy="0"/>
+        </a:xfrm>
+      </p:grpSpPr>
+      <p:sp>
+        <p:nvSpPr>
+          <p:cNvPr id="2" name="Title 1">
+            <a:extLst>
+              <a:ext uri="{FF2B5EF4-FFF2-40B4-BE49-F238E27FC236}">
+                <a16:creationId xmlns:a16="http://schemas.microsoft.com/office/drawing/2014/main" id="{5CB309E0-A0EC-0279-DCBB-93706C6E1E1E}"/>
+              </a:ext>
+            </a:extLst>
+          </p:cNvPr>
+          <p:cNvSpPr>
+            <a:spLocks noGrp="1"/>
+          </p:cNvSpPr>
+          <p:nvPr>
+            <p:ph type="title"/>
+          </p:nvPr>
+        </p:nvSpPr>
+        <p:spPr>
+          <a:xfrm>
+            <a:off x="1231300" y="608076"/>
+            <a:ext cx="9167229" cy="1069848"/>
+          </a:xfrm>
+        </p:spPr>
+        <p:txBody>
+          <a:bodyPr/>
+          <a:lstStyle/>
+          <a:p>
+            <a:r>
+              <a:rPr lang="en-US" sz="2800" dirty="0"/>
+              <a:t>Project 04: Custom Class, Encapsulation, Read data from Scanner</a:t>
+            </a:r>
+          </a:p>
+        </p:txBody>
+      </p:sp>
+      <p:sp>
+        <p:nvSpPr>
+          <p:cNvPr id="5" name="Text Placeholder 4">
+            <a:extLst>
+              <a:ext uri="{FF2B5EF4-FFF2-40B4-BE49-F238E27FC236}">
+                <a16:creationId xmlns:a16="http://schemas.microsoft.com/office/drawing/2014/main" id="{22564BB5-5D3B-430C-017E-20E568806296}"/>
+              </a:ext>
+            </a:extLst>
+          </p:cNvPr>
+          <p:cNvSpPr>
+            <a:spLocks noGrp="1"/>
+          </p:cNvSpPr>
+          <p:nvPr>
+            <p:ph type="body" sz="quarter" idx="3"/>
+          </p:nvPr>
+        </p:nvSpPr>
+        <p:spPr>
+          <a:xfrm>
+            <a:off x="1231300" y="1778506"/>
+            <a:ext cx="3621024" cy="493776"/>
+          </a:xfrm>
+        </p:spPr>
+        <p:txBody>
+          <a:bodyPr/>
+          <a:lstStyle/>
+          <a:p>
+            <a:r>
+              <a:rPr lang="en-US" dirty="0"/>
+              <a:t>Goals: </a:t>
+            </a:r>
+          </a:p>
+        </p:txBody>
+      </p:sp>
+      <p:sp>
+        <p:nvSpPr>
+          <p:cNvPr id="6" name="Content Placeholder 5">
+            <a:extLst>
+              <a:ext uri="{FF2B5EF4-FFF2-40B4-BE49-F238E27FC236}">
+                <a16:creationId xmlns:a16="http://schemas.microsoft.com/office/drawing/2014/main" id="{8849371D-DA57-1968-E868-2BC49FED8232}"/>
+              </a:ext>
+            </a:extLst>
+          </p:cNvPr>
+          <p:cNvSpPr>
+            <a:spLocks noGrp="1"/>
+          </p:cNvSpPr>
+          <p:nvPr>
+            <p:ph sz="quarter" idx="4"/>
+          </p:nvPr>
+        </p:nvSpPr>
+        <p:spPr>
+          <a:xfrm>
+            <a:off x="1166645" y="2272282"/>
+            <a:ext cx="3621024" cy="3221645"/>
+          </a:xfrm>
+        </p:spPr>
+        <p:txBody>
+          <a:bodyPr/>
+          <a:lstStyle/>
+          <a:p>
+            <a:r>
+              <a:rPr lang="en-US" sz="1200" dirty="0"/>
+              <a:t>Movie is an object class that contains private fields of what we use to classify our ‘movie’.</a:t>
+            </a:r>
+          </a:p>
+          <a:p>
+            <a:pPr lvl="1"/>
+            <a:r>
+              <a:rPr lang="en-US" sz="1200" dirty="0"/>
+              <a:t>We access the ‘private’ content of our object by creating public ‘getters and setters’ that can return information about the object, or transform that object.</a:t>
+            </a:r>
+          </a:p>
+          <a:p>
+            <a:r>
+              <a:rPr lang="en-US" sz="1200" dirty="0"/>
+              <a:t>Keeping the internal aspects of the object ‘private’ and using the ‘getters and setters’ is an example of encapsulation.</a:t>
+            </a:r>
+          </a:p>
+          <a:p>
+            <a:r>
+              <a:rPr lang="en-US" sz="1200" dirty="0"/>
+              <a:t>We again have a scanner that takes user input and stores that information for use in our </a:t>
+            </a:r>
+            <a:r>
+              <a:rPr lang="en-US" sz="1200" dirty="0" err="1"/>
+              <a:t>ArrayList</a:t>
+            </a:r>
+            <a:r>
+              <a:rPr lang="en-US" sz="1200" dirty="0"/>
+              <a:t>.</a:t>
+            </a:r>
+          </a:p>
+          <a:p>
+            <a:pPr lvl="1"/>
+            <a:endParaRPr lang="en-US" sz="1000" dirty="0"/>
+          </a:p>
+          <a:p>
+            <a:pPr lvl="1"/>
+            <a:endParaRPr lang="en-US" sz="1000" dirty="0"/>
+          </a:p>
+        </p:txBody>
+      </p:sp>
+      <p:pic>
+        <p:nvPicPr>
+          <p:cNvPr id="10" name="Picture 9" descr="A screenshot of a computer program&#10;&#10;Description automatically generated">
+            <a:extLst>
+              <a:ext uri="{FF2B5EF4-FFF2-40B4-BE49-F238E27FC236}">
+                <a16:creationId xmlns:a16="http://schemas.microsoft.com/office/drawing/2014/main" id="{913C8957-2309-9583-08C9-DBB4D2C26561}"/>
+              </a:ext>
+            </a:extLst>
+          </p:cNvPr>
+          <p:cNvPicPr>
+            <a:picLocks noChangeAspect="1"/>
+          </p:cNvPicPr>
+          <p:nvPr/>
+        </p:nvPicPr>
+        <p:blipFill>
+          <a:blip r:embed="rId2"/>
+          <a:stretch>
+            <a:fillRect/>
+          </a:stretch>
+        </p:blipFill>
+        <p:spPr>
+          <a:xfrm>
+            <a:off x="4852324" y="1677924"/>
+            <a:ext cx="7339504" cy="4742873"/>
+          </a:xfrm>
+          <a:prstGeom prst="rect">
+            <a:avLst/>
+          </a:prstGeom>
+        </p:spPr>
+      </p:pic>
+    </p:spTree>
+    <p:extLst>
+      <p:ext uri="{BB962C8B-B14F-4D97-AF65-F5344CB8AC3E}">
+        <p14:creationId xmlns:p14="http://schemas.microsoft.com/office/powerpoint/2010/main" val="1486838747"/>
+      </p:ext>
+    </p:extLst>
+  </p:cSld>
+  <p:clrMapOvr>
+    <a:masterClrMapping/>
+  </p:clrMapOvr>
+</p:sld>
+</file>
+
+<file path=ppt/slides/slide12.xml><?xml version="1.0" encoding="utf-8"?>
+<p:sld xmlns:a="http://schemas.openxmlformats.org/drawingml/2006/main" xmlns:r="http://schemas.openxmlformats.org/officeDocument/2006/relationships" xmlns:p="http://schemas.openxmlformats.org/presentationml/2006/main">
+  <p:cSld>
+    <p:spTree>
+      <p:nvGrpSpPr>
+        <p:cNvPr id="1" name="">
+          <a:extLst>
+            <a:ext uri="{FF2B5EF4-FFF2-40B4-BE49-F238E27FC236}">
               <a16:creationId xmlns:a16="http://schemas.microsoft.com/office/drawing/2014/main" id="{496C46B5-9E02-073A-85A9-4C673D4F40C3}"/>
             </a:ext>
           </a:extLst>
@@ -17299,7 +17735,7 @@
           <a:p>
             <a:pPr lvl="1"/>
             <a:r>
-              <a:rPr lang="en-US" sz="1000" dirty="0"/>
+              <a:rPr lang="en-US" sz="1200" dirty="0"/>
               <a:t>The statement confirms that while ‘response’ is NOT equal to ‘no’, ignoring the case that is input, the loop will continue.</a:t>
             </a:r>
           </a:p>
@@ -17370,7 +17806,7 @@
 </p:sld>
 </file>
 
-<file path=ppt/slides/slide11.xml><?xml version="1.0" encoding="utf-8"?>
+<file path=ppt/slides/slide13.xml><?xml version="1.0" encoding="utf-8"?>
 <p:sld xmlns:a="http://schemas.openxmlformats.org/drawingml/2006/main" xmlns:r="http://schemas.openxmlformats.org/officeDocument/2006/relationships" xmlns:p="http://schemas.openxmlformats.org/presentationml/2006/main">
   <p:cSld>
     <p:spTree>
@@ -17564,7 +18000,187 @@
 </p:sld>
 </file>
 
-<file path=ppt/slides/slide12.xml><?xml version="1.0" encoding="utf-8"?>
+<file path=ppt/slides/slide14.xml><?xml version="1.0" encoding="utf-8"?>
+<p:sld xmlns:a="http://schemas.openxmlformats.org/drawingml/2006/main" xmlns:r="http://schemas.openxmlformats.org/officeDocument/2006/relationships" xmlns:p="http://schemas.openxmlformats.org/presentationml/2006/main">
+  <p:cSld>
+    <p:spTree>
+      <p:nvGrpSpPr>
+        <p:cNvPr id="1" name="">
+          <a:extLst>
+            <a:ext uri="{FF2B5EF4-FFF2-40B4-BE49-F238E27FC236}">
+              <a16:creationId xmlns:a16="http://schemas.microsoft.com/office/drawing/2014/main" id="{A179A1EB-1630-982B-1C0D-49EB80D154A1}"/>
+            </a:ext>
+          </a:extLst>
+        </p:cNvPr>
+        <p:cNvGrpSpPr/>
+        <p:nvPr/>
+      </p:nvGrpSpPr>
+      <p:grpSpPr>
+        <a:xfrm>
+          <a:off x="0" y="0"/>
+          <a:ext cx="0" cy="0"/>
+          <a:chOff x="0" y="0"/>
+          <a:chExt cx="0" cy="0"/>
+        </a:xfrm>
+      </p:grpSpPr>
+      <p:sp>
+        <p:nvSpPr>
+          <p:cNvPr id="2" name="Title 1">
+            <a:extLst>
+              <a:ext uri="{FF2B5EF4-FFF2-40B4-BE49-F238E27FC236}">
+                <a16:creationId xmlns:a16="http://schemas.microsoft.com/office/drawing/2014/main" id="{DC2B2816-3439-A3E6-DA7F-240A5E94CDDE}"/>
+              </a:ext>
+            </a:extLst>
+          </p:cNvPr>
+          <p:cNvSpPr>
+            <a:spLocks noGrp="1"/>
+          </p:cNvSpPr>
+          <p:nvPr>
+            <p:ph type="title"/>
+          </p:nvPr>
+        </p:nvSpPr>
+        <p:spPr>
+          <a:xfrm>
+            <a:off x="1231300" y="608076"/>
+            <a:ext cx="9167229" cy="1069848"/>
+          </a:xfrm>
+        </p:spPr>
+        <p:txBody>
+          <a:bodyPr/>
+          <a:lstStyle/>
+          <a:p>
+            <a:r>
+              <a:rPr lang="en-US" sz="2800" dirty="0"/>
+              <a:t>Project 05:Read Data from file using scanner</a:t>
+            </a:r>
+          </a:p>
+        </p:txBody>
+      </p:sp>
+      <p:sp>
+        <p:nvSpPr>
+          <p:cNvPr id="5" name="Text Placeholder 4">
+            <a:extLst>
+              <a:ext uri="{FF2B5EF4-FFF2-40B4-BE49-F238E27FC236}">
+                <a16:creationId xmlns:a16="http://schemas.microsoft.com/office/drawing/2014/main" id="{D2B5EEDD-C34F-120B-8DD7-E7980A704BE6}"/>
+              </a:ext>
+            </a:extLst>
+          </p:cNvPr>
+          <p:cNvSpPr>
+            <a:spLocks noGrp="1"/>
+          </p:cNvSpPr>
+          <p:nvPr>
+            <p:ph type="body" sz="quarter" idx="3"/>
+          </p:nvPr>
+        </p:nvSpPr>
+        <p:spPr>
+          <a:xfrm>
+            <a:off x="1120464" y="1872233"/>
+            <a:ext cx="3621024" cy="493776"/>
+          </a:xfrm>
+        </p:spPr>
+        <p:txBody>
+          <a:bodyPr/>
+          <a:lstStyle/>
+          <a:p>
+            <a:r>
+              <a:rPr lang="en-US" dirty="0"/>
+              <a:t>Goals: </a:t>
+            </a:r>
+          </a:p>
+        </p:txBody>
+      </p:sp>
+      <p:sp>
+        <p:nvSpPr>
+          <p:cNvPr id="6" name="Content Placeholder 5">
+            <a:extLst>
+              <a:ext uri="{FF2B5EF4-FFF2-40B4-BE49-F238E27FC236}">
+                <a16:creationId xmlns:a16="http://schemas.microsoft.com/office/drawing/2014/main" id="{0A85A20E-396C-A021-3067-3827DD15F8C5}"/>
+              </a:ext>
+            </a:extLst>
+          </p:cNvPr>
+          <p:cNvSpPr>
+            <a:spLocks noGrp="1"/>
+          </p:cNvSpPr>
+          <p:nvPr>
+            <p:ph sz="quarter" idx="4"/>
+          </p:nvPr>
+        </p:nvSpPr>
+        <p:spPr>
+          <a:xfrm>
+            <a:off x="1002130" y="2560318"/>
+            <a:ext cx="3621024" cy="1581376"/>
+          </a:xfrm>
+        </p:spPr>
+        <p:txBody>
+          <a:bodyPr/>
+          <a:lstStyle/>
+          <a:p>
+            <a:pPr lvl="1"/>
+            <a:r>
+              <a:rPr lang="en-US" sz="1200" dirty="0"/>
+              <a:t>Loads a file (catsAndRooms.txt) and then reads information from the text file. </a:t>
+            </a:r>
+          </a:p>
+          <a:p>
+            <a:pPr lvl="2"/>
+            <a:r>
+              <a:rPr lang="en-US" sz="1200" dirty="0"/>
+              <a:t>It then reads the Cat Data and Room Data from the file. </a:t>
+            </a:r>
+          </a:p>
+          <a:p>
+            <a:pPr lvl="2"/>
+            <a:r>
+              <a:rPr lang="en-US" sz="1200" dirty="0"/>
+              <a:t>The program searches for keywords ‘cats:’ and ‘rooms:’. </a:t>
+            </a:r>
+          </a:p>
+        </p:txBody>
+      </p:sp>
+      <p:pic>
+        <p:nvPicPr>
+          <p:cNvPr id="7" name="Picture 6">
+            <a:extLst>
+              <a:ext uri="{FF2B5EF4-FFF2-40B4-BE49-F238E27FC236}">
+                <a16:creationId xmlns:a16="http://schemas.microsoft.com/office/drawing/2014/main" id="{5D56CA35-3CF9-ADD8-E253-342D57A75285}"/>
+              </a:ext>
+            </a:extLst>
+          </p:cNvPr>
+          <p:cNvPicPr>
+            <a:picLocks noChangeAspect="1"/>
+          </p:cNvPicPr>
+          <p:nvPr/>
+        </p:nvPicPr>
+        <p:blipFill>
+          <a:blip r:embed="rId2"/>
+          <a:stretch>
+            <a:fillRect/>
+          </a:stretch>
+        </p:blipFill>
+        <p:spPr>
+          <a:xfrm>
+            <a:off x="4965227" y="1796929"/>
+            <a:ext cx="6801032" cy="4152049"/>
+          </a:xfrm>
+          <a:prstGeom prst="rect">
+            <a:avLst/>
+          </a:prstGeom>
+        </p:spPr>
+      </p:pic>
+    </p:spTree>
+    <p:extLst>
+      <p:ext uri="{BB962C8B-B14F-4D97-AF65-F5344CB8AC3E}">
+        <p14:creationId xmlns:p14="http://schemas.microsoft.com/office/powerpoint/2010/main" val="383467172"/>
+      </p:ext>
+    </p:extLst>
+  </p:cSld>
+  <p:clrMapOvr>
+    <a:masterClrMapping/>
+  </p:clrMapOvr>
+</p:sld>
+</file>
+
+<file path=ppt/slides/slide15.xml><?xml version="1.0" encoding="utf-8"?>
 <p:sld xmlns:a="http://schemas.openxmlformats.org/drawingml/2006/main" xmlns:r="http://schemas.openxmlformats.org/officeDocument/2006/relationships" xmlns:p="http://schemas.openxmlformats.org/presentationml/2006/main">
   <p:cSld>
     <p:spTree>
@@ -17615,7 +18231,7 @@
           <a:p>
             <a:r>
               <a:rPr lang="en-US" sz="2800" dirty="0"/>
-              <a:t>Project 05: Proper use of Switch statement, Create useful interface and at least 1 class that implements that interface</a:t>
+              <a:t>Project 06: Proper use of Switch statement, Create useful interface and at least 1 class that implements that interface</a:t>
             </a:r>
           </a:p>
         </p:txBody>
@@ -17714,7 +18330,17 @@
           </a:p>
           <a:p>
             <a:pPr lvl="1"/>
-            <a:endParaRPr lang="en-US" sz="1000" dirty="0"/>
+            <a:r>
+              <a:rPr lang="en-US" sz="1200" dirty="0"/>
+              <a:t>Switch statements evaluate an expression against values contained in a ‘case’ clause. </a:t>
+            </a:r>
+          </a:p>
+          <a:p>
+            <a:pPr lvl="1"/>
+            <a:r>
+              <a:rPr lang="en-US" sz="1200" dirty="0"/>
+              <a:t>If the expression information matches a case value the case statement is executed until a break statement occurs. </a:t>
+            </a:r>
           </a:p>
           <a:p>
             <a:pPr lvl="1"/>
@@ -17724,10 +18350,10 @@
       </p:sp>
       <p:pic>
         <p:nvPicPr>
-          <p:cNvPr id="7" name="Picture 6" descr="A screenshot of a computer program&#10;&#10;Description automatically generated">
-            <a:extLst>
-              <a:ext uri="{FF2B5EF4-FFF2-40B4-BE49-F238E27FC236}">
-                <a16:creationId xmlns:a16="http://schemas.microsoft.com/office/drawing/2014/main" id="{284D3536-3E94-286F-A08E-FA6CC18623B2}"/>
+          <p:cNvPr id="4" name="Picture 3">
+            <a:extLst>
+              <a:ext uri="{FF2B5EF4-FFF2-40B4-BE49-F238E27FC236}">
+                <a16:creationId xmlns:a16="http://schemas.microsoft.com/office/drawing/2014/main" id="{F28AF11A-3472-F364-3333-7FF5638480EB}"/>
               </a:ext>
             </a:extLst>
           </p:cNvPr>
@@ -17744,8 +18370,8 @@
         </p:blipFill>
         <p:spPr>
           <a:xfrm>
-            <a:off x="5424220" y="1876506"/>
-            <a:ext cx="6767780" cy="4373418"/>
+            <a:off x="4868921" y="1677924"/>
+            <a:ext cx="7233432" cy="4433394"/>
           </a:xfrm>
           <a:prstGeom prst="rect">
             <a:avLst/>
@@ -17765,7 +18391,7 @@
 </p:sld>
 </file>
 
-<file path=ppt/slides/slide13.xml><?xml version="1.0" encoding="utf-8"?>
+<file path=ppt/slides/slide16.xml><?xml version="1.0" encoding="utf-8"?>
 <p:sld xmlns:a="http://schemas.openxmlformats.org/drawingml/2006/main" xmlns:r="http://schemas.openxmlformats.org/officeDocument/2006/relationships" xmlns:p="http://schemas.openxmlformats.org/presentationml/2006/main">
   <p:cSld>
     <p:spTree>
@@ -17816,7 +18442,7 @@
           <a:p>
             <a:r>
               <a:rPr lang="en-US" sz="2800" dirty="0"/>
-              <a:t>Project 05B:Create useful class with 1 overloaded method</a:t>
+              <a:t>Project 06B:Create useful class with 1 overloaded method</a:t>
             </a:r>
           </a:p>
         </p:txBody>
@@ -17950,12 +18576,18 @@
 </p:sld>
 </file>
 
-<file path=ppt/slides/slide14.xml><?xml version="1.0" encoding="utf-8"?>
+<file path=ppt/slides/slide17.xml><?xml version="1.0" encoding="utf-8"?>
 <p:sld xmlns:a="http://schemas.openxmlformats.org/drawingml/2006/main" xmlns:r="http://schemas.openxmlformats.org/officeDocument/2006/relationships" xmlns:p="http://schemas.openxmlformats.org/presentationml/2006/main">
   <p:cSld>
     <p:spTree>
       <p:nvGrpSpPr>
-        <p:cNvPr id="1" name=""/>
+        <p:cNvPr id="1" name="">
+          <a:extLst>
+            <a:ext uri="{FF2B5EF4-FFF2-40B4-BE49-F238E27FC236}">
+              <a16:creationId xmlns:a16="http://schemas.microsoft.com/office/drawing/2014/main" id="{7A7DEE4E-C1BB-A44F-B431-FDAAEF5DB229}"/>
+            </a:ext>
+          </a:extLst>
+        </p:cNvPr>
         <p:cNvGrpSpPr/>
         <p:nvPr/>
       </p:nvGrpSpPr>
@@ -17972,7 +18604,7 @@
           <p:cNvPr id="2" name="Title 1">
             <a:extLst>
               <a:ext uri="{FF2B5EF4-FFF2-40B4-BE49-F238E27FC236}">
-                <a16:creationId xmlns:a16="http://schemas.microsoft.com/office/drawing/2014/main" id="{48C5BC92-868A-26B2-CBC0-C9D94E65F1A4}"/>
+                <a16:creationId xmlns:a16="http://schemas.microsoft.com/office/drawing/2014/main" id="{92D6332B-6E88-3AF2-F161-3C5BBA245940}"/>
               </a:ext>
             </a:extLst>
           </p:cNvPr>
@@ -17980,39 +18612,32 @@
             <a:spLocks noGrp="1"/>
           </p:cNvSpPr>
           <p:nvPr>
-            <p:ph type="ctrTitle"/>
+            <p:ph type="title"/>
           </p:nvPr>
         </p:nvSpPr>
-        <p:spPr/>
+        <p:spPr>
+          <a:xfrm>
+            <a:off x="1231300" y="608076"/>
+            <a:ext cx="9167229" cy="1069848"/>
+          </a:xfrm>
+        </p:spPr>
         <p:txBody>
           <a:bodyPr/>
           <a:lstStyle/>
           <a:p>
             <a:r>
-              <a:rPr lang="en-US" sz="4000" b="1" spc="600" dirty="0">
-                <a:ln w="28575">
-                  <a:noFill/>
-                  <a:prstDash val="solid"/>
-                </a:ln>
-                <a:solidFill>
-                  <a:schemeClr val="bg1"/>
-                </a:solidFill>
-                <a:latin typeface="Tw Cen MT" panose="020B0602020104020603" pitchFamily="34" charset="77"/>
-                <a:ea typeface="Verdana" panose="020B0604030504040204" pitchFamily="34" charset="0"/>
-                <a:cs typeface="Verdana" panose="020B0604030504040204" pitchFamily="34" charset="0"/>
-              </a:rPr>
-              <a:t>SUMMARY</a:t>
-            </a:r>
-            <a:endParaRPr lang="en-US" dirty="0"/>
-          </a:p>
-        </p:txBody>
-      </p:sp>
-      <p:sp>
-        <p:nvSpPr>
-          <p:cNvPr id="3" name="Subtitle 2">
-            <a:extLst>
-              <a:ext uri="{FF2B5EF4-FFF2-40B4-BE49-F238E27FC236}">
-                <a16:creationId xmlns:a16="http://schemas.microsoft.com/office/drawing/2014/main" id="{6F9C1627-7A56-025E-482D-E2AB014EDF92}"/>
+              <a:rPr lang="en-US" sz="2800" dirty="0"/>
+              <a:t>Project 07:Properly Utilize a 2-dimensional array</a:t>
+            </a:r>
+          </a:p>
+        </p:txBody>
+      </p:sp>
+      <p:sp>
+        <p:nvSpPr>
+          <p:cNvPr id="5" name="Text Placeholder 4">
+            <a:extLst>
+              <a:ext uri="{FF2B5EF4-FFF2-40B4-BE49-F238E27FC236}">
+                <a16:creationId xmlns:a16="http://schemas.microsoft.com/office/drawing/2014/main" id="{E11541E4-36FF-EBA1-C5C3-A83EDD173EAD}"/>
               </a:ext>
             </a:extLst>
           </p:cNvPr>
@@ -18020,133 +18645,121 @@
             <a:spLocks noGrp="1"/>
           </p:cNvSpPr>
           <p:nvPr>
-            <p:ph type="subTitle" idx="1"/>
+            <p:ph type="body" sz="quarter" idx="3"/>
           </p:nvPr>
         </p:nvSpPr>
         <p:spPr>
           <a:xfrm>
-            <a:off x="2228088" y="3685031"/>
-            <a:ext cx="7735824" cy="2232883"/>
+            <a:off x="1120464" y="1872233"/>
+            <a:ext cx="3621024" cy="493776"/>
           </a:xfrm>
         </p:spPr>
         <p:txBody>
           <a:bodyPr/>
           <a:lstStyle/>
           <a:p>
-            <a:pPr algn="l"/>
-            <a:r>
-              <a:rPr lang="en-US" sz="1200" dirty="0">
-                <a:solidFill>
-                  <a:schemeClr val="bg1"/>
-                </a:solidFill>
-                <a:latin typeface="Segoe UI Light" panose="020B0502040204020203" pitchFamily="34" charset="0"/>
-                <a:ea typeface="+mn-lt"/>
-                <a:cs typeface="Segoe UI Light" panose="020B0502040204020203" pitchFamily="34" charset="0"/>
-              </a:rPr>
-              <a:t>Throughout these projects, I've demonstrated my ability to grasp and apply essential Java programming concepts, meeting all the portfolio requirements. Starting with simple tasks like printing to the console and performing mathematical operations, I progressively tackled more complex challenges such as parsing strings, using </a:t>
-            </a:r>
-            <a:r>
-              <a:rPr lang="en-US" sz="1200" dirty="0" err="1">
-                <a:solidFill>
-                  <a:schemeClr val="bg1"/>
-                </a:solidFill>
-                <a:latin typeface="Segoe UI Light" panose="020B0502040204020203" pitchFamily="34" charset="0"/>
-                <a:ea typeface="+mn-lt"/>
-                <a:cs typeface="Segoe UI Light" panose="020B0502040204020203" pitchFamily="34" charset="0"/>
-              </a:rPr>
-              <a:t>enums</a:t>
-            </a:r>
-            <a:r>
-              <a:rPr lang="en-US" sz="1200" dirty="0">
-                <a:solidFill>
-                  <a:schemeClr val="bg1"/>
-                </a:solidFill>
-                <a:latin typeface="Segoe UI Light" panose="020B0502040204020203" pitchFamily="34" charset="0"/>
-                <a:ea typeface="+mn-lt"/>
-                <a:cs typeface="Segoe UI Light" panose="020B0502040204020203" pitchFamily="34" charset="0"/>
-              </a:rPr>
-              <a:t>, and handling file inputs. </a:t>
-            </a:r>
-          </a:p>
-          <a:p>
-            <a:pPr algn="l"/>
-            <a:r>
-              <a:rPr lang="en-US" sz="1200" dirty="0">
-                <a:solidFill>
-                  <a:schemeClr val="bg1"/>
-                </a:solidFill>
-                <a:latin typeface="Segoe UI Light" panose="020B0502040204020203" pitchFamily="34" charset="0"/>
-                <a:ea typeface="+mn-lt"/>
-                <a:cs typeface="Segoe UI Light" panose="020B0502040204020203" pitchFamily="34" charset="0"/>
-              </a:rPr>
-              <a:t>The Movie Collection app, for instance, showcases my proficiency in creating custom classes, utilizing encapsulation, and managing data using </a:t>
-            </a:r>
-            <a:r>
-              <a:rPr lang="en-US" sz="1200" dirty="0" err="1">
-                <a:solidFill>
-                  <a:schemeClr val="bg1"/>
-                </a:solidFill>
-                <a:latin typeface="Segoe UI Light" panose="020B0502040204020203" pitchFamily="34" charset="0"/>
-                <a:ea typeface="+mn-lt"/>
-                <a:cs typeface="Segoe UI Light" panose="020B0502040204020203" pitchFamily="34" charset="0"/>
-              </a:rPr>
-              <a:t>ArrayLists</a:t>
-            </a:r>
-            <a:r>
-              <a:rPr lang="en-US" sz="1200" dirty="0">
-                <a:solidFill>
-                  <a:schemeClr val="bg1"/>
-                </a:solidFill>
-                <a:latin typeface="Segoe UI Light" panose="020B0502040204020203" pitchFamily="34" charset="0"/>
-                <a:ea typeface="+mn-lt"/>
-                <a:cs typeface="Segoe UI Light" panose="020B0502040204020203" pitchFamily="34" charset="0"/>
-              </a:rPr>
-              <a:t>. In the </a:t>
-            </a:r>
-            <a:r>
-              <a:rPr lang="en-US" sz="1200" dirty="0" err="1">
-                <a:solidFill>
-                  <a:schemeClr val="bg1"/>
-                </a:solidFill>
-                <a:latin typeface="Segoe UI Light" panose="020B0502040204020203" pitchFamily="34" charset="0"/>
-                <a:ea typeface="+mn-lt"/>
-                <a:cs typeface="Segoe UI Light" panose="020B0502040204020203" pitchFamily="34" charset="0"/>
-              </a:rPr>
-              <a:t>RoboWarriorExtreme</a:t>
-            </a:r>
-            <a:r>
-              <a:rPr lang="en-US" sz="1200" dirty="0">
-                <a:solidFill>
-                  <a:schemeClr val="bg1"/>
-                </a:solidFill>
-                <a:latin typeface="Segoe UI Light" panose="020B0502040204020203" pitchFamily="34" charset="0"/>
-                <a:ea typeface="+mn-lt"/>
-                <a:cs typeface="Segoe UI Light" panose="020B0502040204020203" pitchFamily="34" charset="0"/>
-              </a:rPr>
-              <a:t> project, I highlighted my understanding of switch statements, interface implementation, and method overloading. </a:t>
-            </a:r>
-          </a:p>
-          <a:p>
-            <a:pPr algn="l"/>
-            <a:r>
-              <a:rPr lang="en-US" sz="1200" dirty="0">
-                <a:solidFill>
-                  <a:schemeClr val="bg1"/>
-                </a:solidFill>
-                <a:latin typeface="Segoe UI Light" panose="020B0502040204020203" pitchFamily="34" charset="0"/>
-                <a:ea typeface="+mn-lt"/>
-                <a:cs typeface="Segoe UI Light" panose="020B0502040204020203" pitchFamily="34" charset="0"/>
-              </a:rPr>
-              <a:t>These projects collectively illustrate my capability to solve practical problems with Java, underscoring my readiness to take on more advanced software development tasks. This portfolio not only reflects my technical skills but also my journey as an enthusiastic student of programming.</a:t>
-            </a:r>
-            <a:endParaRPr lang="en-US" sz="1200" dirty="0"/>
-          </a:p>
-        </p:txBody>
-      </p:sp>
+            <a:r>
+              <a:rPr lang="en-US" dirty="0"/>
+              <a:t>Goals: </a:t>
+            </a:r>
+          </a:p>
+        </p:txBody>
+      </p:sp>
+      <p:sp>
+        <p:nvSpPr>
+          <p:cNvPr id="6" name="Content Placeholder 5">
+            <a:extLst>
+              <a:ext uri="{FF2B5EF4-FFF2-40B4-BE49-F238E27FC236}">
+                <a16:creationId xmlns:a16="http://schemas.microsoft.com/office/drawing/2014/main" id="{646F32D0-3C68-B5EC-C669-E40E0A0FBD9E}"/>
+              </a:ext>
+            </a:extLst>
+          </p:cNvPr>
+          <p:cNvSpPr>
+            <a:spLocks noGrp="1"/>
+          </p:cNvSpPr>
+          <p:nvPr>
+            <p:ph sz="quarter" idx="4"/>
+          </p:nvPr>
+        </p:nvSpPr>
+        <p:spPr>
+          <a:xfrm>
+            <a:off x="819250" y="2483033"/>
+            <a:ext cx="3621024" cy="3221645"/>
+          </a:xfrm>
+        </p:spPr>
+        <p:txBody>
+          <a:bodyPr/>
+          <a:lstStyle/>
+          <a:p>
+            <a:pPr lvl="1"/>
+            <a:r>
+              <a:rPr lang="en-US" sz="1200" dirty="0"/>
+              <a:t>The Shipping class contains the ‘</a:t>
+            </a:r>
+            <a:r>
+              <a:rPr lang="en-US" sz="1200" dirty="0" err="1"/>
+              <a:t>orderDetails</a:t>
+            </a:r>
+            <a:r>
+              <a:rPr lang="en-US" sz="1200" dirty="0"/>
+              <a:t>’ 2-Dimensional String array.</a:t>
+            </a:r>
+          </a:p>
+          <a:p>
+            <a:pPr lvl="2"/>
+            <a:r>
+              <a:rPr lang="en-US" sz="1200" dirty="0"/>
+              <a:t>The Shipping constructor then utilizes the </a:t>
+            </a:r>
+            <a:r>
+              <a:rPr lang="en-US" sz="1200" dirty="0" err="1"/>
+              <a:t>orderDetails</a:t>
+            </a:r>
+            <a:r>
+              <a:rPr lang="en-US" sz="1200" dirty="0"/>
+              <a:t> 2-Dimensional array. </a:t>
+            </a:r>
+          </a:p>
+          <a:p>
+            <a:pPr lvl="1"/>
+            <a:endParaRPr lang="en-US" sz="1000" dirty="0"/>
+          </a:p>
+        </p:txBody>
+      </p:sp>
+      <p:pic>
+        <p:nvPicPr>
+          <p:cNvPr id="7" name="Picture 6">
+            <a:extLst>
+              <a:ext uri="{FF2B5EF4-FFF2-40B4-BE49-F238E27FC236}">
+                <a16:creationId xmlns:a16="http://schemas.microsoft.com/office/drawing/2014/main" id="{F84F1924-561F-03A2-FC40-25FB62091D6C}"/>
+              </a:ext>
+            </a:extLst>
+          </p:cNvPr>
+          <p:cNvPicPr>
+            <a:picLocks noChangeAspect="1"/>
+          </p:cNvPicPr>
+          <p:nvPr/>
+        </p:nvPicPr>
+        <p:blipFill>
+          <a:blip r:embed="rId2"/>
+          <a:stretch>
+            <a:fillRect/>
+          </a:stretch>
+        </p:blipFill>
+        <p:spPr>
+          <a:xfrm>
+            <a:off x="4632253" y="1872233"/>
+            <a:ext cx="7437828" cy="4558669"/>
+          </a:xfrm>
+          <a:prstGeom prst="rect">
+            <a:avLst/>
+          </a:prstGeom>
+        </p:spPr>
+      </p:pic>
     </p:spTree>
     <p:extLst>
       <p:ext uri="{BB962C8B-B14F-4D97-AF65-F5344CB8AC3E}">
-        <p14:creationId xmlns:p14="http://schemas.microsoft.com/office/powerpoint/2010/main" val="1958759625"/>
+        <p14:creationId xmlns:p14="http://schemas.microsoft.com/office/powerpoint/2010/main" val="509297028"/>
       </p:ext>
     </p:extLst>
   </p:cSld>
@@ -18156,12 +18769,18 @@
 </p:sld>
 </file>
 
-<file path=ppt/slides/slide15.xml><?xml version="1.0" encoding="utf-8"?>
+<file path=ppt/slides/slide18.xml><?xml version="1.0" encoding="utf-8"?>
 <p:sld xmlns:a="http://schemas.openxmlformats.org/drawingml/2006/main" xmlns:r="http://schemas.openxmlformats.org/officeDocument/2006/relationships" xmlns:p="http://schemas.openxmlformats.org/presentationml/2006/main">
   <p:cSld>
     <p:spTree>
       <p:nvGrpSpPr>
-        <p:cNvPr id="1" name=""/>
+        <p:cNvPr id="1" name="">
+          <a:extLst>
+            <a:ext uri="{FF2B5EF4-FFF2-40B4-BE49-F238E27FC236}">
+              <a16:creationId xmlns:a16="http://schemas.microsoft.com/office/drawing/2014/main" id="{6336CECE-124C-01AD-625F-C0399D2B8E79}"/>
+            </a:ext>
+          </a:extLst>
+        </p:cNvPr>
         <p:cNvGrpSpPr/>
         <p:nvPr/>
       </p:nvGrpSpPr>
@@ -18178,7 +18797,7 @@
           <p:cNvPr id="2" name="Title 1">
             <a:extLst>
               <a:ext uri="{FF2B5EF4-FFF2-40B4-BE49-F238E27FC236}">
-                <a16:creationId xmlns:a16="http://schemas.microsoft.com/office/drawing/2014/main" id="{2C9E1892-81E6-551C-7B5A-DEA68224520B}"/>
+                <a16:creationId xmlns:a16="http://schemas.microsoft.com/office/drawing/2014/main" id="{4D92730F-42FD-2FEB-88E6-B7A86B415930}"/>
               </a:ext>
             </a:extLst>
           </p:cNvPr>
@@ -18189,34 +18808,29 @@
             <p:ph type="title"/>
           </p:nvPr>
         </p:nvSpPr>
-        <p:spPr/>
+        <p:spPr>
+          <a:xfrm>
+            <a:off x="1231300" y="608076"/>
+            <a:ext cx="9167229" cy="1069848"/>
+          </a:xfrm>
+        </p:spPr>
         <p:txBody>
           <a:bodyPr/>
           <a:lstStyle/>
           <a:p>
             <a:r>
-              <a:rPr lang="en-US" sz="4800" b="1" spc="600" dirty="0">
-                <a:ln w="28575">
-                  <a:noFill/>
-                  <a:prstDash val="solid"/>
-                </a:ln>
-                <a:solidFill>
-                  <a:schemeClr val="bg1"/>
-                </a:solidFill>
-                <a:latin typeface="Tw Cen MT" panose="020B0602020104020603" pitchFamily="34" charset="77"/>
-              </a:rPr>
-              <a:t>THANK YOU</a:t>
-            </a:r>
-            <a:endParaRPr lang="en-US" dirty="0"/>
-          </a:p>
-        </p:txBody>
-      </p:sp>
-      <p:sp>
-        <p:nvSpPr>
-          <p:cNvPr id="3" name="Text Placeholder 2">
-            <a:extLst>
-              <a:ext uri="{FF2B5EF4-FFF2-40B4-BE49-F238E27FC236}">
-                <a16:creationId xmlns:a16="http://schemas.microsoft.com/office/drawing/2014/main" id="{55519D01-29BE-BE76-41C5-9D58AD8119DC}"/>
+              <a:rPr lang="en-US" sz="2800" dirty="0"/>
+              <a:t>Project 07b:Properly override a method in a subclass &amp; utilize super() in a subclass constructor</a:t>
+            </a:r>
+          </a:p>
+        </p:txBody>
+      </p:sp>
+      <p:sp>
+        <p:nvSpPr>
+          <p:cNvPr id="5" name="Text Placeholder 4">
+            <a:extLst>
+              <a:ext uri="{FF2B5EF4-FFF2-40B4-BE49-F238E27FC236}">
+                <a16:creationId xmlns:a16="http://schemas.microsoft.com/office/drawing/2014/main" id="{AFD3A6E1-0AB4-04F9-2453-A2700AF57EB5}"/>
               </a:ext>
             </a:extLst>
           </p:cNvPr>
@@ -18224,52 +18838,358 @@
             <a:spLocks noGrp="1"/>
           </p:cNvSpPr>
           <p:nvPr>
-            <p:ph type="body" idx="1"/>
+            <p:ph type="body" sz="quarter" idx="3"/>
           </p:nvPr>
         </p:nvSpPr>
-        <p:spPr/>
+        <p:spPr>
+          <a:xfrm>
+            <a:off x="1120464" y="1872233"/>
+            <a:ext cx="3621024" cy="493776"/>
+          </a:xfrm>
+        </p:spPr>
         <p:txBody>
           <a:bodyPr/>
           <a:lstStyle/>
           <a:p>
-            <a:pPr algn="l"/>
-            <a:r>
-              <a:rPr lang="en-US" dirty="0">
-                <a:latin typeface="Segoe UI Light" panose="020B0502040204020203" pitchFamily="34" charset="0"/>
-                <a:cs typeface="Segoe UI Light" panose="020B0502040204020203" pitchFamily="34" charset="0"/>
-              </a:rPr>
-              <a:t>JEFFREY WALLEY</a:t>
-            </a:r>
-          </a:p>
-          <a:p>
-            <a:pPr algn="l"/>
-            <a:r>
-              <a:rPr lang="en-US" dirty="0">
-                <a:latin typeface="Segoe UI Light" panose="020B0502040204020203" pitchFamily="34" charset="0"/>
-                <a:ea typeface="Calibri"/>
-                <a:cs typeface="Segoe UI Light" panose="020B0502040204020203" pitchFamily="34" charset="0"/>
-              </a:rPr>
-              <a:t>jeffreywalley@student.bpcc.edu</a:t>
-            </a:r>
-          </a:p>
-          <a:p>
-            <a:pPr algn="l"/>
-            <a:r>
-              <a:rPr lang="en-US" dirty="0">
-                <a:latin typeface="Segoe UI Light" panose="020B0502040204020203" pitchFamily="34" charset="0"/>
-                <a:ea typeface="Calibri"/>
-                <a:cs typeface="Segoe UI Light" panose="020B0502040204020203" pitchFamily="34" charset="0"/>
-              </a:rPr>
-              <a:t>https://walleyworks.netlify.app/</a:t>
-            </a:r>
-            <a:endParaRPr lang="en-US" dirty="0"/>
-          </a:p>
-        </p:txBody>
-      </p:sp>
+            <a:r>
+              <a:rPr lang="en-US" dirty="0"/>
+              <a:t>Goals: </a:t>
+            </a:r>
+          </a:p>
+        </p:txBody>
+      </p:sp>
+      <p:sp>
+        <p:nvSpPr>
+          <p:cNvPr id="6" name="Content Placeholder 5">
+            <a:extLst>
+              <a:ext uri="{FF2B5EF4-FFF2-40B4-BE49-F238E27FC236}">
+                <a16:creationId xmlns:a16="http://schemas.microsoft.com/office/drawing/2014/main" id="{AFD81FCA-C430-459A-D496-183D8C4EBE13}"/>
+              </a:ext>
+            </a:extLst>
+          </p:cNvPr>
+          <p:cNvSpPr>
+            <a:spLocks noGrp="1"/>
+          </p:cNvSpPr>
+          <p:nvPr>
+            <p:ph sz="quarter" idx="4"/>
+          </p:nvPr>
+        </p:nvSpPr>
+        <p:spPr>
+          <a:xfrm>
+            <a:off x="819249" y="2483034"/>
+            <a:ext cx="4086237" cy="2917306"/>
+          </a:xfrm>
+        </p:spPr>
+        <p:txBody>
+          <a:bodyPr/>
+          <a:lstStyle/>
+          <a:p>
+            <a:pPr lvl="1"/>
+            <a:r>
+              <a:rPr lang="en-US" sz="1200" dirty="0"/>
+              <a:t>@Override of the </a:t>
+            </a:r>
+            <a:r>
+              <a:rPr lang="en-US" sz="1200" dirty="0" err="1"/>
+              <a:t>compareTo</a:t>
+            </a:r>
+            <a:r>
+              <a:rPr lang="en-US" sz="1200" dirty="0"/>
+              <a:t> and </a:t>
+            </a:r>
+            <a:r>
+              <a:rPr lang="en-US" sz="1200" dirty="0" err="1"/>
+              <a:t>toString</a:t>
+            </a:r>
+            <a:r>
+              <a:rPr lang="en-US" sz="1200" dirty="0"/>
+              <a:t>.</a:t>
+            </a:r>
+          </a:p>
+          <a:p>
+            <a:pPr lvl="1"/>
+            <a:r>
+              <a:rPr lang="en-US" sz="1200" dirty="0"/>
+              <a:t>super(message) calls the constructor of the superclass(Exception).</a:t>
+            </a:r>
+          </a:p>
+          <a:p>
+            <a:pPr lvl="1"/>
+            <a:endParaRPr lang="en-US" sz="1100" dirty="0"/>
+          </a:p>
+        </p:txBody>
+      </p:sp>
+      <p:pic>
+        <p:nvPicPr>
+          <p:cNvPr id="11" name="Picture 10">
+            <a:extLst>
+              <a:ext uri="{FF2B5EF4-FFF2-40B4-BE49-F238E27FC236}">
+                <a16:creationId xmlns:a16="http://schemas.microsoft.com/office/drawing/2014/main" id="{BD1D47DF-7C65-7DAD-E8AB-FB85ADEB3C7C}"/>
+              </a:ext>
+            </a:extLst>
+          </p:cNvPr>
+          <p:cNvPicPr>
+            <a:picLocks noChangeAspect="1"/>
+          </p:cNvPicPr>
+          <p:nvPr/>
+        </p:nvPicPr>
+        <p:blipFill>
+          <a:blip r:embed="rId2"/>
+          <a:stretch>
+            <a:fillRect/>
+          </a:stretch>
+        </p:blipFill>
+        <p:spPr>
+          <a:xfrm>
+            <a:off x="5238974" y="1677924"/>
+            <a:ext cx="6734287" cy="2420740"/>
+          </a:xfrm>
+          <a:prstGeom prst="rect">
+            <a:avLst/>
+          </a:prstGeom>
+        </p:spPr>
+      </p:pic>
+      <p:pic>
+        <p:nvPicPr>
+          <p:cNvPr id="13" name="Picture 12">
+            <a:extLst>
+              <a:ext uri="{FF2B5EF4-FFF2-40B4-BE49-F238E27FC236}">
+                <a16:creationId xmlns:a16="http://schemas.microsoft.com/office/drawing/2014/main" id="{92D4F2CD-B99E-89C6-16CA-588711335286}"/>
+              </a:ext>
+            </a:extLst>
+          </p:cNvPr>
+          <p:cNvPicPr>
+            <a:picLocks noChangeAspect="1"/>
+          </p:cNvPicPr>
+          <p:nvPr/>
+        </p:nvPicPr>
+        <p:blipFill>
+          <a:blip r:embed="rId3"/>
+          <a:stretch>
+            <a:fillRect/>
+          </a:stretch>
+        </p:blipFill>
+        <p:spPr>
+          <a:xfrm>
+            <a:off x="5238974" y="4227754"/>
+            <a:ext cx="6832613" cy="2420739"/>
+          </a:xfrm>
+          <a:prstGeom prst="rect">
+            <a:avLst/>
+          </a:prstGeom>
+        </p:spPr>
+      </p:pic>
     </p:spTree>
     <p:extLst>
       <p:ext uri="{BB962C8B-B14F-4D97-AF65-F5344CB8AC3E}">
-        <p14:creationId xmlns:p14="http://schemas.microsoft.com/office/powerpoint/2010/main" val="1877701230"/>
+        <p14:creationId xmlns:p14="http://schemas.microsoft.com/office/powerpoint/2010/main" val="3730843735"/>
+      </p:ext>
+    </p:extLst>
+  </p:cSld>
+  <p:clrMapOvr>
+    <a:masterClrMapping/>
+  </p:clrMapOvr>
+</p:sld>
+</file>
+
+<file path=ppt/slides/slide19.xml><?xml version="1.0" encoding="utf-8"?>
+<p:sld xmlns:a="http://schemas.openxmlformats.org/drawingml/2006/main" xmlns:r="http://schemas.openxmlformats.org/officeDocument/2006/relationships" xmlns:p="http://schemas.openxmlformats.org/presentationml/2006/main">
+  <p:cSld>
+    <p:spTree>
+      <p:nvGrpSpPr>
+        <p:cNvPr id="1" name="">
+          <a:extLst>
+            <a:ext uri="{FF2B5EF4-FFF2-40B4-BE49-F238E27FC236}">
+              <a16:creationId xmlns:a16="http://schemas.microsoft.com/office/drawing/2014/main" id="{E59428B2-B266-822D-83F1-B6AAA924E46C}"/>
+            </a:ext>
+          </a:extLst>
+        </p:cNvPr>
+        <p:cNvGrpSpPr/>
+        <p:nvPr/>
+      </p:nvGrpSpPr>
+      <p:grpSpPr>
+        <a:xfrm>
+          <a:off x="0" y="0"/>
+          <a:ext cx="0" cy="0"/>
+          <a:chOff x="0" y="0"/>
+          <a:chExt cx="0" cy="0"/>
+        </a:xfrm>
+      </p:grpSpPr>
+      <p:sp>
+        <p:nvSpPr>
+          <p:cNvPr id="2" name="Title 1">
+            <a:extLst>
+              <a:ext uri="{FF2B5EF4-FFF2-40B4-BE49-F238E27FC236}">
+                <a16:creationId xmlns:a16="http://schemas.microsoft.com/office/drawing/2014/main" id="{9B9F0DC1-73E7-BCB8-075C-06D2864944EA}"/>
+              </a:ext>
+            </a:extLst>
+          </p:cNvPr>
+          <p:cNvSpPr>
+            <a:spLocks noGrp="1"/>
+          </p:cNvSpPr>
+          <p:nvPr>
+            <p:ph type="title"/>
+          </p:nvPr>
+        </p:nvSpPr>
+        <p:spPr>
+          <a:xfrm>
+            <a:off x="1231300" y="608076"/>
+            <a:ext cx="9167229" cy="1069848"/>
+          </a:xfrm>
+        </p:spPr>
+        <p:txBody>
+          <a:bodyPr/>
+          <a:lstStyle/>
+          <a:p>
+            <a:r>
+              <a:rPr lang="en-US" sz="2800" dirty="0"/>
+              <a:t>Project 07c:Properly implement the Comparable interface; Create a custom Exception</a:t>
+            </a:r>
+          </a:p>
+        </p:txBody>
+      </p:sp>
+      <p:sp>
+        <p:nvSpPr>
+          <p:cNvPr id="5" name="Text Placeholder 4">
+            <a:extLst>
+              <a:ext uri="{FF2B5EF4-FFF2-40B4-BE49-F238E27FC236}">
+                <a16:creationId xmlns:a16="http://schemas.microsoft.com/office/drawing/2014/main" id="{2028984F-FE0D-701B-EBC2-C0E71B190527}"/>
+              </a:ext>
+            </a:extLst>
+          </p:cNvPr>
+          <p:cNvSpPr>
+            <a:spLocks noGrp="1"/>
+          </p:cNvSpPr>
+          <p:nvPr>
+            <p:ph type="body" sz="quarter" idx="3"/>
+          </p:nvPr>
+        </p:nvSpPr>
+        <p:spPr>
+          <a:xfrm>
+            <a:off x="1120464" y="1872233"/>
+            <a:ext cx="3621024" cy="493776"/>
+          </a:xfrm>
+        </p:spPr>
+        <p:txBody>
+          <a:bodyPr/>
+          <a:lstStyle/>
+          <a:p>
+            <a:r>
+              <a:rPr lang="en-US" dirty="0"/>
+              <a:t>Goals: </a:t>
+            </a:r>
+          </a:p>
+        </p:txBody>
+      </p:sp>
+      <p:sp>
+        <p:nvSpPr>
+          <p:cNvPr id="6" name="Content Placeholder 5">
+            <a:extLst>
+              <a:ext uri="{FF2B5EF4-FFF2-40B4-BE49-F238E27FC236}">
+                <a16:creationId xmlns:a16="http://schemas.microsoft.com/office/drawing/2014/main" id="{6E3792E0-9B16-B25E-F3C7-523B6CFBCADC}"/>
+              </a:ext>
+            </a:extLst>
+          </p:cNvPr>
+          <p:cNvSpPr>
+            <a:spLocks noGrp="1"/>
+          </p:cNvSpPr>
+          <p:nvPr>
+            <p:ph sz="quarter" idx="4"/>
+          </p:nvPr>
+        </p:nvSpPr>
+        <p:spPr>
+          <a:xfrm>
+            <a:off x="819249" y="2483034"/>
+            <a:ext cx="4086237" cy="2917306"/>
+          </a:xfrm>
+        </p:spPr>
+        <p:txBody>
+          <a:bodyPr/>
+          <a:lstStyle/>
+          <a:p>
+            <a:pPr lvl="1"/>
+            <a:r>
+              <a:rPr lang="en-US" sz="1200" dirty="0"/>
+              <a:t>The Shipping class implements the Comparable&lt;Shipping&gt; interface.</a:t>
+            </a:r>
+          </a:p>
+          <a:p>
+            <a:pPr lvl="1"/>
+            <a:r>
+              <a:rPr lang="en-US" sz="1200" dirty="0" err="1"/>
+              <a:t>InvalidItemSelectionException</a:t>
+            </a:r>
+            <a:r>
+              <a:rPr lang="en-US" sz="1200" dirty="0"/>
+              <a:t> is a custom exception class.</a:t>
+            </a:r>
+          </a:p>
+        </p:txBody>
+      </p:sp>
+      <p:pic>
+        <p:nvPicPr>
+          <p:cNvPr id="4" name="Picture 3">
+            <a:extLst>
+              <a:ext uri="{FF2B5EF4-FFF2-40B4-BE49-F238E27FC236}">
+                <a16:creationId xmlns:a16="http://schemas.microsoft.com/office/drawing/2014/main" id="{A5E40F45-7CB4-60A9-0770-3A9935738065}"/>
+              </a:ext>
+            </a:extLst>
+          </p:cNvPr>
+          <p:cNvPicPr>
+            <a:picLocks noChangeAspect="1"/>
+          </p:cNvPicPr>
+          <p:nvPr/>
+        </p:nvPicPr>
+        <p:blipFill>
+          <a:blip r:embed="rId2"/>
+          <a:stretch>
+            <a:fillRect/>
+          </a:stretch>
+        </p:blipFill>
+        <p:spPr>
+          <a:xfrm>
+            <a:off x="5880846" y="1249102"/>
+            <a:ext cx="5866504" cy="2702860"/>
+          </a:xfrm>
+          <a:prstGeom prst="rect">
+            <a:avLst/>
+          </a:prstGeom>
+        </p:spPr>
+      </p:pic>
+      <p:pic>
+        <p:nvPicPr>
+          <p:cNvPr id="8" name="Picture 7">
+            <a:extLst>
+              <a:ext uri="{FF2B5EF4-FFF2-40B4-BE49-F238E27FC236}">
+                <a16:creationId xmlns:a16="http://schemas.microsoft.com/office/drawing/2014/main" id="{E6A9B4C4-88ED-684E-5C1F-41573B126968}"/>
+              </a:ext>
+            </a:extLst>
+          </p:cNvPr>
+          <p:cNvPicPr>
+            <a:picLocks noChangeAspect="1"/>
+          </p:cNvPicPr>
+          <p:nvPr/>
+        </p:nvPicPr>
+        <p:blipFill>
+          <a:blip r:embed="rId3"/>
+          <a:stretch>
+            <a:fillRect/>
+          </a:stretch>
+        </p:blipFill>
+        <p:spPr>
+          <a:xfrm>
+            <a:off x="5880846" y="4087906"/>
+            <a:ext cx="5866504" cy="2614107"/>
+          </a:xfrm>
+          <a:prstGeom prst="rect">
+            <a:avLst/>
+          </a:prstGeom>
+        </p:spPr>
+      </p:pic>
+    </p:spTree>
+    <p:extLst>
+      <p:ext uri="{BB962C8B-B14F-4D97-AF65-F5344CB8AC3E}">
+        <p14:creationId xmlns:p14="http://schemas.microsoft.com/office/powerpoint/2010/main" val="1380148821"/>
       </p:ext>
     </p:extLst>
   </p:cSld>
@@ -18481,6 +19401,694 @@
     <p:extLst>
       <p:ext uri="{BB962C8B-B14F-4D97-AF65-F5344CB8AC3E}">
         <p14:creationId xmlns:p14="http://schemas.microsoft.com/office/powerpoint/2010/main" val="3548027083"/>
+      </p:ext>
+    </p:extLst>
+  </p:cSld>
+  <p:clrMapOvr>
+    <a:masterClrMapping/>
+  </p:clrMapOvr>
+</p:sld>
+</file>
+
+<file path=ppt/slides/slide20.xml><?xml version="1.0" encoding="utf-8"?>
+<p:sld xmlns:a="http://schemas.openxmlformats.org/drawingml/2006/main" xmlns:r="http://schemas.openxmlformats.org/officeDocument/2006/relationships" xmlns:p="http://schemas.openxmlformats.org/presentationml/2006/main">
+  <p:cSld>
+    <p:spTree>
+      <p:nvGrpSpPr>
+        <p:cNvPr id="1" name="">
+          <a:extLst>
+            <a:ext uri="{FF2B5EF4-FFF2-40B4-BE49-F238E27FC236}">
+              <a16:creationId xmlns:a16="http://schemas.microsoft.com/office/drawing/2014/main" id="{9D191D48-1D02-F5BA-D7C4-981D9EF406EB}"/>
+            </a:ext>
+          </a:extLst>
+        </p:cNvPr>
+        <p:cNvGrpSpPr/>
+        <p:nvPr/>
+      </p:nvGrpSpPr>
+      <p:grpSpPr>
+        <a:xfrm>
+          <a:off x="0" y="0"/>
+          <a:ext cx="0" cy="0"/>
+          <a:chOff x="0" y="0"/>
+          <a:chExt cx="0" cy="0"/>
+        </a:xfrm>
+      </p:grpSpPr>
+      <p:sp>
+        <p:nvSpPr>
+          <p:cNvPr id="2" name="Title 1">
+            <a:extLst>
+              <a:ext uri="{FF2B5EF4-FFF2-40B4-BE49-F238E27FC236}">
+                <a16:creationId xmlns:a16="http://schemas.microsoft.com/office/drawing/2014/main" id="{046E48A9-3A1F-22C6-E93A-F7336A0D4D9D}"/>
+              </a:ext>
+            </a:extLst>
+          </p:cNvPr>
+          <p:cNvSpPr>
+            <a:spLocks noGrp="1"/>
+          </p:cNvSpPr>
+          <p:nvPr>
+            <p:ph type="title"/>
+          </p:nvPr>
+        </p:nvSpPr>
+        <p:spPr>
+          <a:xfrm>
+            <a:off x="1231300" y="608076"/>
+            <a:ext cx="9167229" cy="1069848"/>
+          </a:xfrm>
+        </p:spPr>
+        <p:txBody>
+          <a:bodyPr/>
+          <a:lstStyle/>
+          <a:p>
+            <a:r>
+              <a:rPr lang="en-US" sz="2800" dirty="0"/>
+              <a:t>Project 07d:Properly implement a try / catch statement; Properly write data to a file</a:t>
+            </a:r>
+          </a:p>
+        </p:txBody>
+      </p:sp>
+      <p:sp>
+        <p:nvSpPr>
+          <p:cNvPr id="5" name="Text Placeholder 4">
+            <a:extLst>
+              <a:ext uri="{FF2B5EF4-FFF2-40B4-BE49-F238E27FC236}">
+                <a16:creationId xmlns:a16="http://schemas.microsoft.com/office/drawing/2014/main" id="{A9F9155F-6BD0-A2DE-3DC5-7D26EA6CBC62}"/>
+              </a:ext>
+            </a:extLst>
+          </p:cNvPr>
+          <p:cNvSpPr>
+            <a:spLocks noGrp="1"/>
+          </p:cNvSpPr>
+          <p:nvPr>
+            <p:ph type="body" sz="quarter" idx="3"/>
+          </p:nvPr>
+        </p:nvSpPr>
+        <p:spPr>
+          <a:xfrm>
+            <a:off x="1120464" y="1872233"/>
+            <a:ext cx="3621024" cy="493776"/>
+          </a:xfrm>
+        </p:spPr>
+        <p:txBody>
+          <a:bodyPr/>
+          <a:lstStyle/>
+          <a:p>
+            <a:r>
+              <a:rPr lang="en-US" dirty="0"/>
+              <a:t>Goals: </a:t>
+            </a:r>
+          </a:p>
+        </p:txBody>
+      </p:sp>
+      <p:sp>
+        <p:nvSpPr>
+          <p:cNvPr id="6" name="Content Placeholder 5">
+            <a:extLst>
+              <a:ext uri="{FF2B5EF4-FFF2-40B4-BE49-F238E27FC236}">
+                <a16:creationId xmlns:a16="http://schemas.microsoft.com/office/drawing/2014/main" id="{E869B68D-8A47-6320-36B5-25B06726299F}"/>
+              </a:ext>
+            </a:extLst>
+          </p:cNvPr>
+          <p:cNvSpPr>
+            <a:spLocks noGrp="1"/>
+          </p:cNvSpPr>
+          <p:nvPr>
+            <p:ph sz="quarter" idx="4"/>
+          </p:nvPr>
+        </p:nvSpPr>
+        <p:spPr>
+          <a:xfrm>
+            <a:off x="819249" y="2483034"/>
+            <a:ext cx="4086237" cy="2917306"/>
+          </a:xfrm>
+        </p:spPr>
+        <p:txBody>
+          <a:bodyPr/>
+          <a:lstStyle/>
+          <a:p>
+            <a:pPr lvl="1"/>
+            <a:r>
+              <a:rPr lang="en-US" sz="1200" dirty="0"/>
+              <a:t>Try / Catch blocks are used to correctly manage and control errors in code. </a:t>
+            </a:r>
+          </a:p>
+          <a:p>
+            <a:pPr lvl="1"/>
+            <a:r>
+              <a:rPr lang="en-US" sz="1200" dirty="0"/>
+              <a:t>In this code I used </a:t>
+            </a:r>
+            <a:r>
+              <a:rPr lang="en-US" sz="1200" dirty="0" err="1"/>
+              <a:t>BufferedWriter</a:t>
+            </a:r>
+            <a:r>
+              <a:rPr lang="en-US" sz="1200" dirty="0"/>
+              <a:t> to create and append the ‘orders.txt’ file. </a:t>
+            </a:r>
+          </a:p>
+        </p:txBody>
+      </p:sp>
+      <p:pic>
+        <p:nvPicPr>
+          <p:cNvPr id="7" name="Picture 6">
+            <a:extLst>
+              <a:ext uri="{FF2B5EF4-FFF2-40B4-BE49-F238E27FC236}">
+                <a16:creationId xmlns:a16="http://schemas.microsoft.com/office/drawing/2014/main" id="{6646B7D7-87EC-4F53-2537-D2F3F6026EC4}"/>
+              </a:ext>
+            </a:extLst>
+          </p:cNvPr>
+          <p:cNvPicPr>
+            <a:picLocks noChangeAspect="1"/>
+          </p:cNvPicPr>
+          <p:nvPr/>
+        </p:nvPicPr>
+        <p:blipFill>
+          <a:blip r:embed="rId2"/>
+          <a:stretch>
+            <a:fillRect/>
+          </a:stretch>
+        </p:blipFill>
+        <p:spPr>
+          <a:xfrm>
+            <a:off x="5700047" y="1872233"/>
+            <a:ext cx="6275660" cy="3878132"/>
+          </a:xfrm>
+          <a:prstGeom prst="rect">
+            <a:avLst/>
+          </a:prstGeom>
+        </p:spPr>
+      </p:pic>
+    </p:spTree>
+    <p:extLst>
+      <p:ext uri="{BB962C8B-B14F-4D97-AF65-F5344CB8AC3E}">
+        <p14:creationId xmlns:p14="http://schemas.microsoft.com/office/powerpoint/2010/main" val="2846405512"/>
+      </p:ext>
+    </p:extLst>
+  </p:cSld>
+  <p:clrMapOvr>
+    <a:masterClrMapping/>
+  </p:clrMapOvr>
+</p:sld>
+</file>
+
+<file path=ppt/slides/slide21.xml><?xml version="1.0" encoding="utf-8"?>
+<p:sld xmlns:a="http://schemas.openxmlformats.org/drawingml/2006/main" xmlns:r="http://schemas.openxmlformats.org/officeDocument/2006/relationships" xmlns:p="http://schemas.openxmlformats.org/presentationml/2006/main">
+  <p:cSld>
+    <p:spTree>
+      <p:nvGrpSpPr>
+        <p:cNvPr id="1" name="">
+          <a:extLst>
+            <a:ext uri="{FF2B5EF4-FFF2-40B4-BE49-F238E27FC236}">
+              <a16:creationId xmlns:a16="http://schemas.microsoft.com/office/drawing/2014/main" id="{50E376F4-3050-5A03-825D-B7CB43A8BBB0}"/>
+            </a:ext>
+          </a:extLst>
+        </p:cNvPr>
+        <p:cNvGrpSpPr/>
+        <p:nvPr/>
+      </p:nvGrpSpPr>
+      <p:grpSpPr>
+        <a:xfrm>
+          <a:off x="0" y="0"/>
+          <a:ext cx="0" cy="0"/>
+          <a:chOff x="0" y="0"/>
+          <a:chExt cx="0" cy="0"/>
+        </a:xfrm>
+      </p:grpSpPr>
+      <p:sp>
+        <p:nvSpPr>
+          <p:cNvPr id="2" name="Title 1">
+            <a:extLst>
+              <a:ext uri="{FF2B5EF4-FFF2-40B4-BE49-F238E27FC236}">
+                <a16:creationId xmlns:a16="http://schemas.microsoft.com/office/drawing/2014/main" id="{B12D280A-6ED8-6F47-C140-E0A36953CD2E}"/>
+              </a:ext>
+            </a:extLst>
+          </p:cNvPr>
+          <p:cNvSpPr>
+            <a:spLocks noGrp="1"/>
+          </p:cNvSpPr>
+          <p:nvPr>
+            <p:ph type="title"/>
+          </p:nvPr>
+        </p:nvSpPr>
+        <p:spPr>
+          <a:xfrm>
+            <a:off x="1231300" y="608076"/>
+            <a:ext cx="9167229" cy="1069848"/>
+          </a:xfrm>
+        </p:spPr>
+        <p:txBody>
+          <a:bodyPr/>
+          <a:lstStyle/>
+          <a:p>
+            <a:r>
+              <a:rPr lang="en-US" sz="2800" dirty="0"/>
+              <a:t>Project 07e:Display an understanding of how a recursive algorithm is implemented</a:t>
+            </a:r>
+          </a:p>
+        </p:txBody>
+      </p:sp>
+      <p:sp>
+        <p:nvSpPr>
+          <p:cNvPr id="5" name="Text Placeholder 4">
+            <a:extLst>
+              <a:ext uri="{FF2B5EF4-FFF2-40B4-BE49-F238E27FC236}">
+                <a16:creationId xmlns:a16="http://schemas.microsoft.com/office/drawing/2014/main" id="{39460262-37E6-F82C-9684-90CC02489CF0}"/>
+              </a:ext>
+            </a:extLst>
+          </p:cNvPr>
+          <p:cNvSpPr>
+            <a:spLocks noGrp="1"/>
+          </p:cNvSpPr>
+          <p:nvPr>
+            <p:ph type="body" sz="quarter" idx="3"/>
+          </p:nvPr>
+        </p:nvSpPr>
+        <p:spPr>
+          <a:xfrm>
+            <a:off x="1120464" y="1872233"/>
+            <a:ext cx="3621024" cy="493776"/>
+          </a:xfrm>
+        </p:spPr>
+        <p:txBody>
+          <a:bodyPr/>
+          <a:lstStyle/>
+          <a:p>
+            <a:r>
+              <a:rPr lang="en-US" dirty="0"/>
+              <a:t>Goals: </a:t>
+            </a:r>
+          </a:p>
+        </p:txBody>
+      </p:sp>
+      <p:sp>
+        <p:nvSpPr>
+          <p:cNvPr id="6" name="Content Placeholder 5">
+            <a:extLst>
+              <a:ext uri="{FF2B5EF4-FFF2-40B4-BE49-F238E27FC236}">
+                <a16:creationId xmlns:a16="http://schemas.microsoft.com/office/drawing/2014/main" id="{5D056EC6-F83A-D77C-CEDC-59F965A13237}"/>
+              </a:ext>
+            </a:extLst>
+          </p:cNvPr>
+          <p:cNvSpPr>
+            <a:spLocks noGrp="1"/>
+          </p:cNvSpPr>
+          <p:nvPr>
+            <p:ph sz="quarter" idx="4"/>
+          </p:nvPr>
+        </p:nvSpPr>
+        <p:spPr>
+          <a:xfrm>
+            <a:off x="887857" y="2483034"/>
+            <a:ext cx="4086237" cy="2917306"/>
+          </a:xfrm>
+        </p:spPr>
+        <p:txBody>
+          <a:bodyPr/>
+          <a:lstStyle/>
+          <a:p>
+            <a:pPr lvl="1"/>
+            <a:r>
+              <a:rPr lang="en-US" sz="1200" dirty="0"/>
+              <a:t>This recursive algorithm goes through shipping information and returns the total value of orders within a certain date range. </a:t>
+            </a:r>
+          </a:p>
+          <a:p>
+            <a:pPr lvl="2"/>
+            <a:r>
+              <a:rPr lang="en-US" sz="1200" dirty="0"/>
+              <a:t>Recursive methods call upon themselves to complete complex tasks by breaking them down into simpler sub-tasks.</a:t>
+            </a:r>
+          </a:p>
+        </p:txBody>
+      </p:sp>
+      <p:pic>
+        <p:nvPicPr>
+          <p:cNvPr id="4" name="Picture 3">
+            <a:extLst>
+              <a:ext uri="{FF2B5EF4-FFF2-40B4-BE49-F238E27FC236}">
+                <a16:creationId xmlns:a16="http://schemas.microsoft.com/office/drawing/2014/main" id="{D227E04D-C578-4D95-40F5-2D41BD9E5E37}"/>
+              </a:ext>
+            </a:extLst>
+          </p:cNvPr>
+          <p:cNvPicPr>
+            <a:picLocks noChangeAspect="1"/>
+          </p:cNvPicPr>
+          <p:nvPr/>
+        </p:nvPicPr>
+        <p:blipFill>
+          <a:blip r:embed="rId2"/>
+          <a:stretch>
+            <a:fillRect/>
+          </a:stretch>
+        </p:blipFill>
+        <p:spPr>
+          <a:xfrm>
+            <a:off x="5238973" y="2041971"/>
+            <a:ext cx="6423199" cy="3969306"/>
+          </a:xfrm>
+          <a:prstGeom prst="rect">
+            <a:avLst/>
+          </a:prstGeom>
+        </p:spPr>
+      </p:pic>
+    </p:spTree>
+    <p:extLst>
+      <p:ext uri="{BB962C8B-B14F-4D97-AF65-F5344CB8AC3E}">
+        <p14:creationId xmlns:p14="http://schemas.microsoft.com/office/powerpoint/2010/main" val="1331222600"/>
+      </p:ext>
+    </p:extLst>
+  </p:cSld>
+  <p:clrMapOvr>
+    <a:masterClrMapping/>
+  </p:clrMapOvr>
+</p:sld>
+</file>
+
+<file path=ppt/slides/slide22.xml><?xml version="1.0" encoding="utf-8"?>
+<p:sld xmlns:a="http://schemas.openxmlformats.org/drawingml/2006/main" xmlns:r="http://schemas.openxmlformats.org/officeDocument/2006/relationships" xmlns:p="http://schemas.openxmlformats.org/presentationml/2006/main">
+  <p:cSld>
+    <p:spTree>
+      <p:nvGrpSpPr>
+        <p:cNvPr id="1" name=""/>
+        <p:cNvGrpSpPr/>
+        <p:nvPr/>
+      </p:nvGrpSpPr>
+      <p:grpSpPr>
+        <a:xfrm>
+          <a:off x="0" y="0"/>
+          <a:ext cx="0" cy="0"/>
+          <a:chOff x="0" y="0"/>
+          <a:chExt cx="0" cy="0"/>
+        </a:xfrm>
+      </p:grpSpPr>
+      <p:sp>
+        <p:nvSpPr>
+          <p:cNvPr id="2" name="Title 1">
+            <a:extLst>
+              <a:ext uri="{FF2B5EF4-FFF2-40B4-BE49-F238E27FC236}">
+                <a16:creationId xmlns:a16="http://schemas.microsoft.com/office/drawing/2014/main" id="{48C5BC92-868A-26B2-CBC0-C9D94E65F1A4}"/>
+              </a:ext>
+            </a:extLst>
+          </p:cNvPr>
+          <p:cNvSpPr>
+            <a:spLocks noGrp="1"/>
+          </p:cNvSpPr>
+          <p:nvPr>
+            <p:ph type="ctrTitle"/>
+          </p:nvPr>
+        </p:nvSpPr>
+        <p:spPr>
+          <a:xfrm>
+            <a:off x="2228088" y="2233287"/>
+            <a:ext cx="7735824" cy="1069848"/>
+          </a:xfrm>
+        </p:spPr>
+        <p:txBody>
+          <a:bodyPr/>
+          <a:lstStyle/>
+          <a:p>
+            <a:r>
+              <a:rPr lang="en-US" sz="4000" b="1" spc="600" dirty="0">
+                <a:ln w="28575">
+                  <a:noFill/>
+                  <a:prstDash val="solid"/>
+                </a:ln>
+                <a:solidFill>
+                  <a:schemeClr val="bg1"/>
+                </a:solidFill>
+                <a:latin typeface="Tw Cen MT" panose="020B0602020104020603" pitchFamily="34" charset="77"/>
+                <a:ea typeface="Verdana" panose="020B0604030504040204" pitchFamily="34" charset="0"/>
+                <a:cs typeface="Verdana" panose="020B0604030504040204" pitchFamily="34" charset="0"/>
+              </a:rPr>
+              <a:t>SUMMARY</a:t>
+            </a:r>
+            <a:endParaRPr lang="en-US" dirty="0"/>
+          </a:p>
+        </p:txBody>
+      </p:sp>
+      <p:sp>
+        <p:nvSpPr>
+          <p:cNvPr id="3" name="Subtitle 2">
+            <a:extLst>
+              <a:ext uri="{FF2B5EF4-FFF2-40B4-BE49-F238E27FC236}">
+                <a16:creationId xmlns:a16="http://schemas.microsoft.com/office/drawing/2014/main" id="{6F9C1627-7A56-025E-482D-E2AB014EDF92}"/>
+              </a:ext>
+            </a:extLst>
+          </p:cNvPr>
+          <p:cNvSpPr>
+            <a:spLocks noGrp="1"/>
+          </p:cNvSpPr>
+          <p:nvPr>
+            <p:ph type="subTitle" idx="1"/>
+          </p:nvPr>
+        </p:nvSpPr>
+        <p:spPr>
+          <a:xfrm>
+            <a:off x="2228088" y="3685031"/>
+            <a:ext cx="7735824" cy="2232883"/>
+          </a:xfrm>
+        </p:spPr>
+        <p:txBody>
+          <a:bodyPr/>
+          <a:lstStyle/>
+          <a:p>
+            <a:pPr algn="l"/>
+            <a:r>
+              <a:rPr lang="en-US" sz="1200" dirty="0">
+                <a:solidFill>
+                  <a:schemeClr val="bg1"/>
+                </a:solidFill>
+                <a:latin typeface="Segoe UI Light" panose="020B0502040204020203" pitchFamily="34" charset="0"/>
+                <a:ea typeface="+mn-lt"/>
+                <a:cs typeface="Segoe UI Light" panose="020B0502040204020203" pitchFamily="34" charset="0"/>
+              </a:rPr>
+              <a:t>Throughout these projects, I've demonstrated my ability to grasp and apply essential Java programming concepts, meeting all the portfolio requirements. Starting with simple tasks like printing to the console and performing mathematical operations, I progressively tackled more complex challenges such as parsing strings, using </a:t>
+            </a:r>
+            <a:r>
+              <a:rPr lang="en-US" sz="1200" dirty="0" err="1">
+                <a:solidFill>
+                  <a:schemeClr val="bg1"/>
+                </a:solidFill>
+                <a:latin typeface="Segoe UI Light" panose="020B0502040204020203" pitchFamily="34" charset="0"/>
+                <a:ea typeface="+mn-lt"/>
+                <a:cs typeface="Segoe UI Light" panose="020B0502040204020203" pitchFamily="34" charset="0"/>
+              </a:rPr>
+              <a:t>enums</a:t>
+            </a:r>
+            <a:r>
+              <a:rPr lang="en-US" sz="1200" dirty="0">
+                <a:solidFill>
+                  <a:schemeClr val="bg1"/>
+                </a:solidFill>
+                <a:latin typeface="Segoe UI Light" panose="020B0502040204020203" pitchFamily="34" charset="0"/>
+                <a:ea typeface="+mn-lt"/>
+                <a:cs typeface="Segoe UI Light" panose="020B0502040204020203" pitchFamily="34" charset="0"/>
+              </a:rPr>
+              <a:t>, and handling file inputs. </a:t>
+            </a:r>
+          </a:p>
+          <a:p>
+            <a:pPr algn="l"/>
+            <a:r>
+              <a:rPr lang="en-US" sz="1200" dirty="0">
+                <a:solidFill>
+                  <a:schemeClr val="bg1"/>
+                </a:solidFill>
+                <a:latin typeface="Segoe UI Light" panose="020B0502040204020203" pitchFamily="34" charset="0"/>
+                <a:ea typeface="+mn-lt"/>
+                <a:cs typeface="Segoe UI Light" panose="020B0502040204020203" pitchFamily="34" charset="0"/>
+              </a:rPr>
+              <a:t>The Movie Collection app, for instance, showcases my proficiency in creating custom classes, utilizing encapsulation, and managing data using </a:t>
+            </a:r>
+            <a:r>
+              <a:rPr lang="en-US" sz="1200" dirty="0" err="1">
+                <a:solidFill>
+                  <a:schemeClr val="bg1"/>
+                </a:solidFill>
+                <a:latin typeface="Segoe UI Light" panose="020B0502040204020203" pitchFamily="34" charset="0"/>
+                <a:ea typeface="+mn-lt"/>
+                <a:cs typeface="Segoe UI Light" panose="020B0502040204020203" pitchFamily="34" charset="0"/>
+              </a:rPr>
+              <a:t>ArrayLists</a:t>
+            </a:r>
+            <a:r>
+              <a:rPr lang="en-US" sz="1200" dirty="0">
+                <a:solidFill>
+                  <a:schemeClr val="bg1"/>
+                </a:solidFill>
+                <a:latin typeface="Segoe UI Light" panose="020B0502040204020203" pitchFamily="34" charset="0"/>
+                <a:ea typeface="+mn-lt"/>
+                <a:cs typeface="Segoe UI Light" panose="020B0502040204020203" pitchFamily="34" charset="0"/>
+              </a:rPr>
+              <a:t>. In the </a:t>
+            </a:r>
+            <a:r>
+              <a:rPr lang="en-US" sz="1200" dirty="0" err="1">
+                <a:solidFill>
+                  <a:schemeClr val="bg1"/>
+                </a:solidFill>
+                <a:latin typeface="Segoe UI Light" panose="020B0502040204020203" pitchFamily="34" charset="0"/>
+                <a:ea typeface="+mn-lt"/>
+                <a:cs typeface="Segoe UI Light" panose="020B0502040204020203" pitchFamily="34" charset="0"/>
+              </a:rPr>
+              <a:t>RoboWarriorExtreme</a:t>
+            </a:r>
+            <a:r>
+              <a:rPr lang="en-US" sz="1200" dirty="0">
+                <a:solidFill>
+                  <a:schemeClr val="bg1"/>
+                </a:solidFill>
+                <a:latin typeface="Segoe UI Light" panose="020B0502040204020203" pitchFamily="34" charset="0"/>
+                <a:ea typeface="+mn-lt"/>
+                <a:cs typeface="Segoe UI Light" panose="020B0502040204020203" pitchFamily="34" charset="0"/>
+              </a:rPr>
+              <a:t> project, I highlighted my understanding of switch statements, interface implementation, and method overloading. </a:t>
+            </a:r>
+          </a:p>
+          <a:p>
+            <a:pPr algn="l"/>
+            <a:r>
+              <a:rPr lang="en-US" sz="1200" dirty="0">
+                <a:solidFill>
+                  <a:schemeClr val="bg1"/>
+                </a:solidFill>
+                <a:latin typeface="Segoe UI Light" panose="020B0502040204020203" pitchFamily="34" charset="0"/>
+                <a:ea typeface="+mn-lt"/>
+                <a:cs typeface="Segoe UI Light" panose="020B0502040204020203" pitchFamily="34" charset="0"/>
+              </a:rPr>
+              <a:t>These projects collectively illustrate my capability to solve practical problems with Java, underscoring my readiness to take on more advanced software development tasks. This portfolio not only reflects my technical skills but also my journey as an enthusiastic student of programming.</a:t>
+            </a:r>
+            <a:endParaRPr lang="en-US" sz="1200" dirty="0"/>
+          </a:p>
+        </p:txBody>
+      </p:sp>
+    </p:spTree>
+    <p:extLst>
+      <p:ext uri="{BB962C8B-B14F-4D97-AF65-F5344CB8AC3E}">
+        <p14:creationId xmlns:p14="http://schemas.microsoft.com/office/powerpoint/2010/main" val="1958759625"/>
+      </p:ext>
+    </p:extLst>
+  </p:cSld>
+  <p:clrMapOvr>
+    <a:masterClrMapping/>
+  </p:clrMapOvr>
+</p:sld>
+</file>
+
+<file path=ppt/slides/slide23.xml><?xml version="1.0" encoding="utf-8"?>
+<p:sld xmlns:a="http://schemas.openxmlformats.org/drawingml/2006/main" xmlns:r="http://schemas.openxmlformats.org/officeDocument/2006/relationships" xmlns:p="http://schemas.openxmlformats.org/presentationml/2006/main">
+  <p:cSld>
+    <p:spTree>
+      <p:nvGrpSpPr>
+        <p:cNvPr id="1" name=""/>
+        <p:cNvGrpSpPr/>
+        <p:nvPr/>
+      </p:nvGrpSpPr>
+      <p:grpSpPr>
+        <a:xfrm>
+          <a:off x="0" y="0"/>
+          <a:ext cx="0" cy="0"/>
+          <a:chOff x="0" y="0"/>
+          <a:chExt cx="0" cy="0"/>
+        </a:xfrm>
+      </p:grpSpPr>
+      <p:sp>
+        <p:nvSpPr>
+          <p:cNvPr id="2" name="Title 1">
+            <a:extLst>
+              <a:ext uri="{FF2B5EF4-FFF2-40B4-BE49-F238E27FC236}">
+                <a16:creationId xmlns:a16="http://schemas.microsoft.com/office/drawing/2014/main" id="{2C9E1892-81E6-551C-7B5A-DEA68224520B}"/>
+              </a:ext>
+            </a:extLst>
+          </p:cNvPr>
+          <p:cNvSpPr>
+            <a:spLocks noGrp="1"/>
+          </p:cNvSpPr>
+          <p:nvPr>
+            <p:ph type="title"/>
+          </p:nvPr>
+        </p:nvSpPr>
+        <p:spPr/>
+        <p:txBody>
+          <a:bodyPr/>
+          <a:lstStyle/>
+          <a:p>
+            <a:r>
+              <a:rPr lang="en-US" sz="4800" b="1" spc="600" dirty="0">
+                <a:ln w="28575">
+                  <a:noFill/>
+                  <a:prstDash val="solid"/>
+                </a:ln>
+                <a:solidFill>
+                  <a:schemeClr val="bg1"/>
+                </a:solidFill>
+                <a:latin typeface="Tw Cen MT" panose="020B0602020104020603" pitchFamily="34" charset="77"/>
+              </a:rPr>
+              <a:t>THANK YOU</a:t>
+            </a:r>
+            <a:endParaRPr lang="en-US" dirty="0"/>
+          </a:p>
+        </p:txBody>
+      </p:sp>
+      <p:sp>
+        <p:nvSpPr>
+          <p:cNvPr id="3" name="Text Placeholder 2">
+            <a:extLst>
+              <a:ext uri="{FF2B5EF4-FFF2-40B4-BE49-F238E27FC236}">
+                <a16:creationId xmlns:a16="http://schemas.microsoft.com/office/drawing/2014/main" id="{55519D01-29BE-BE76-41C5-9D58AD8119DC}"/>
+              </a:ext>
+            </a:extLst>
+          </p:cNvPr>
+          <p:cNvSpPr>
+            <a:spLocks noGrp="1"/>
+          </p:cNvSpPr>
+          <p:nvPr>
+            <p:ph type="body" idx="1"/>
+          </p:nvPr>
+        </p:nvSpPr>
+        <p:spPr/>
+        <p:txBody>
+          <a:bodyPr/>
+          <a:lstStyle/>
+          <a:p>
+            <a:pPr algn="l"/>
+            <a:r>
+              <a:rPr lang="en-US" dirty="0">
+                <a:latin typeface="Segoe UI Light" panose="020B0502040204020203" pitchFamily="34" charset="0"/>
+                <a:cs typeface="Segoe UI Light" panose="020B0502040204020203" pitchFamily="34" charset="0"/>
+              </a:rPr>
+              <a:t>JEFFREY WALLEY</a:t>
+            </a:r>
+          </a:p>
+          <a:p>
+            <a:pPr algn="l"/>
+            <a:r>
+              <a:rPr lang="en-US" dirty="0">
+                <a:latin typeface="Segoe UI Light" panose="020B0502040204020203" pitchFamily="34" charset="0"/>
+                <a:ea typeface="Calibri"/>
+                <a:cs typeface="Segoe UI Light" panose="020B0502040204020203" pitchFamily="34" charset="0"/>
+              </a:rPr>
+              <a:t>jeffreywalley@student.bpcc.edu</a:t>
+            </a:r>
+          </a:p>
+          <a:p>
+            <a:pPr algn="l"/>
+            <a:r>
+              <a:rPr lang="en-US" dirty="0">
+                <a:latin typeface="Segoe UI Light" panose="020B0502040204020203" pitchFamily="34" charset="0"/>
+                <a:ea typeface="Calibri"/>
+                <a:cs typeface="Segoe UI Light" panose="020B0502040204020203" pitchFamily="34" charset="0"/>
+              </a:rPr>
+              <a:t>https://walleyworks.netlify.app/</a:t>
+            </a:r>
+            <a:endParaRPr lang="en-US" dirty="0"/>
+          </a:p>
+        </p:txBody>
+      </p:sp>
+    </p:spTree>
+    <p:extLst>
+      <p:ext uri="{BB962C8B-B14F-4D97-AF65-F5344CB8AC3E}">
+        <p14:creationId xmlns:p14="http://schemas.microsoft.com/office/powerpoint/2010/main" val="1877701230"/>
       </p:ext>
     </p:extLst>
   </p:cSld>
@@ -18726,7 +20334,13 @@
   <p:cSld>
     <p:spTree>
       <p:nvGrpSpPr>
-        <p:cNvPr id="1" name=""/>
+        <p:cNvPr id="1" name="">
+          <a:extLst>
+            <a:ext uri="{FF2B5EF4-FFF2-40B4-BE49-F238E27FC236}">
+              <a16:creationId xmlns:a16="http://schemas.microsoft.com/office/drawing/2014/main" id="{04A8FFB4-0F20-623A-D6FC-9D0291EC29B7}"/>
+            </a:ext>
+          </a:extLst>
+        </p:cNvPr>
         <p:cNvGrpSpPr/>
         <p:nvPr/>
       </p:nvGrpSpPr>
@@ -18743,7 +20357,7 @@
           <p:cNvPr id="2" name="Title 1">
             <a:extLst>
               <a:ext uri="{FF2B5EF4-FFF2-40B4-BE49-F238E27FC236}">
-                <a16:creationId xmlns:a16="http://schemas.microsoft.com/office/drawing/2014/main" id="{F41F0E99-07CC-9576-AFD7-C52151AD0EA3}"/>
+                <a16:creationId xmlns:a16="http://schemas.microsoft.com/office/drawing/2014/main" id="{8A5FFD60-5289-1A13-1345-C62E379AE70E}"/>
               </a:ext>
             </a:extLst>
           </p:cNvPr>
@@ -18751,32 +20365,39 @@
             <a:spLocks noGrp="1"/>
           </p:cNvSpPr>
           <p:nvPr>
-            <p:ph type="ctrTitle"/>
+            <p:ph type="title"/>
           </p:nvPr>
         </p:nvSpPr>
-        <p:spPr>
-          <a:xfrm>
-            <a:off x="2228088" y="1798389"/>
-            <a:ext cx="7735824" cy="1069848"/>
-          </a:xfrm>
-        </p:spPr>
-        <p:txBody>
-          <a:bodyPr/>
+        <p:spPr/>
+        <p:txBody>
+          <a:bodyPr>
+            <a:normAutofit/>
+          </a:bodyPr>
           <a:lstStyle/>
           <a:p>
             <a:r>
-              <a:rPr lang="en-US" dirty="0"/>
-              <a:t>INTRODUCTION</a:t>
-            </a:r>
-          </a:p>
-        </p:txBody>
-      </p:sp>
-      <p:sp>
-        <p:nvSpPr>
-          <p:cNvPr id="3" name="Subtitle 2">
-            <a:extLst>
-              <a:ext uri="{FF2B5EF4-FFF2-40B4-BE49-F238E27FC236}">
-                <a16:creationId xmlns:a16="http://schemas.microsoft.com/office/drawing/2014/main" id="{5A82A8B0-333F-633E-3FA7-D38DBFB10971}"/>
+              <a:rPr lang="en-US" sz="4000" b="1" spc="600" dirty="0">
+                <a:ln w="28575">
+                  <a:noFill/>
+                  <a:prstDash val="solid"/>
+                </a:ln>
+                <a:solidFill>
+                  <a:schemeClr val="bg1"/>
+                </a:solidFill>
+                <a:latin typeface="Tw Cen MT" panose="020B0602020104020603" pitchFamily="34" charset="77"/>
+              </a:rPr>
+              <a:t>CONTENTS</a:t>
+            </a:r>
+            <a:endParaRPr lang="en-US" dirty="0"/>
+          </a:p>
+        </p:txBody>
+      </p:sp>
+      <p:sp>
+        <p:nvSpPr>
+          <p:cNvPr id="3" name="Content Placeholder 2">
+            <a:extLst>
+              <a:ext uri="{FF2B5EF4-FFF2-40B4-BE49-F238E27FC236}">
+                <a16:creationId xmlns:a16="http://schemas.microsoft.com/office/drawing/2014/main" id="{3AEFCDFB-ABEE-A63B-2A62-AB0CEBA40EBA}"/>
               </a:ext>
             </a:extLst>
           </p:cNvPr>
@@ -18784,111 +20405,119 @@
             <a:spLocks noGrp="1"/>
           </p:cNvSpPr>
           <p:nvPr>
-            <p:ph type="subTitle" idx="1"/>
+            <p:ph idx="1"/>
           </p:nvPr>
         </p:nvSpPr>
-        <p:spPr>
-          <a:xfrm>
-            <a:off x="2057554" y="3658988"/>
-            <a:ext cx="8076892" cy="1909606"/>
-          </a:xfrm>
-        </p:spPr>
+        <p:spPr/>
         <p:txBody>
           <a:bodyPr/>
           <a:lstStyle/>
           <a:p>
-            <a:pPr algn="l"/>
-            <a:r>
-              <a:rPr lang="en-US" sz="1200" b="0" i="0" dirty="0">
+            <a:pPr marL="342900" indent="-342900" algn="l">
+              <a:lnSpc>
+                <a:spcPct val="150000"/>
+              </a:lnSpc>
+              <a:buClr>
+                <a:schemeClr val="accent6"/>
+              </a:buClr>
+              <a:buFont typeface="Courier New" panose="02070309020205020404" pitchFamily="49" charset="0"/>
+              <a:buChar char="o"/>
+            </a:pPr>
+            <a:r>
+              <a:rPr lang="en-US" dirty="0">
                 <a:solidFill>
-                  <a:srgbClr val="F2DDCC"/>
+                  <a:schemeClr val="bg1"/>
                 </a:solidFill>
-                <a:effectLst/>
-                <a:latin typeface="Ginto"/>
+                <a:latin typeface="Segoe UI Light" panose="020B0502040204020203" pitchFamily="34" charset="0"/>
+                <a:cs typeface="Segoe UI Light" panose="020B0502040204020203" pitchFamily="34" charset="0"/>
               </a:rPr>
-              <a:t>Welcome to my project portfolio, a comprehensive showcase of my journey through essential Java programming concepts and techniques. As a college student deeply invested in mastering software development, I have created a series of projects that not only satisfy my portfolio requirements but also demonstrate my ability to apply theoretical knowledge to practical scenarios.</a:t>
-            </a:r>
-          </a:p>
-          <a:p>
-            <a:pPr algn="l"/>
-            <a:r>
-              <a:rPr lang="en-US" sz="1200" b="0" i="0" dirty="0">
-                <a:solidFill>
-                  <a:srgbClr val="F2DDCC"/>
-                </a:solidFill>
-                <a:effectLst/>
-                <a:latin typeface="Ginto"/>
+              <a:t>Ch08: Properly Utilize a 2-D Array</a:t>
+            </a:r>
+          </a:p>
+          <a:p>
+            <a:pPr marL="342900" indent="-342900" algn="l">
+              <a:lnSpc>
+                <a:spcPct val="150000"/>
+              </a:lnSpc>
+              <a:buClr>
+                <a:schemeClr val="accent6"/>
+              </a:buClr>
+              <a:buFont typeface="Courier New" panose="02070309020205020404" pitchFamily="49" charset="0"/>
+              <a:buChar char="o"/>
+            </a:pPr>
+            <a:r>
+              <a:rPr lang="en-US" dirty="0">
+                <a:latin typeface="Segoe UI Light" panose="020B0502040204020203" pitchFamily="34" charset="0"/>
+                <a:cs typeface="Segoe UI Light" panose="020B0502040204020203" pitchFamily="34" charset="0"/>
               </a:rPr>
-              <a:t>This portfolio includes five key projects: printing data to the console, performing mathematical operations, parsing strings and utilizing </a:t>
-            </a:r>
-            <a:r>
-              <a:rPr lang="en-US" sz="1200" b="0" i="0" dirty="0" err="1">
-                <a:solidFill>
-                  <a:srgbClr val="F2DDCC"/>
-                </a:solidFill>
-                <a:effectLst/>
-                <a:latin typeface="Ginto"/>
+              <a:t>Ch09: Properly Override a Method</a:t>
+            </a:r>
+            <a:endParaRPr lang="en-US" dirty="0">
+              <a:solidFill>
+                <a:schemeClr val="bg1"/>
+              </a:solidFill>
+              <a:latin typeface="Segoe UI Light" panose="020B0502040204020203" pitchFamily="34" charset="0"/>
+              <a:cs typeface="Segoe UI Light" panose="020B0502040204020203" pitchFamily="34" charset="0"/>
+            </a:endParaRPr>
+          </a:p>
+          <a:p>
+            <a:pPr marL="342900" indent="-342900" algn="l">
+              <a:lnSpc>
+                <a:spcPct val="150000"/>
+              </a:lnSpc>
+              <a:buClr>
+                <a:schemeClr val="accent6"/>
+              </a:buClr>
+              <a:buFont typeface="Courier New" panose="02070309020205020404" pitchFamily="49" charset="0"/>
+              <a:buChar char="o"/>
+            </a:pPr>
+            <a:r>
+              <a:rPr lang="en-US" dirty="0">
+                <a:latin typeface="Segoe UI Light" panose="020B0502040204020203" pitchFamily="34" charset="0"/>
+                <a:cs typeface="Segoe UI Light" panose="020B0502040204020203" pitchFamily="34" charset="0"/>
               </a:rPr>
-              <a:t>enums</a:t>
-            </a:r>
-            <a:r>
-              <a:rPr lang="en-US" sz="1200" b="0" i="0" dirty="0">
-                <a:solidFill>
-                  <a:srgbClr val="F2DDCC"/>
-                </a:solidFill>
-                <a:effectLst/>
-                <a:latin typeface="Ginto"/>
+              <a:t>Ch09: Properly Utilize ‘super()’ in a subclass</a:t>
+            </a:r>
+            <a:endParaRPr lang="en-US" dirty="0">
+              <a:solidFill>
+                <a:schemeClr val="bg1"/>
+              </a:solidFill>
+              <a:latin typeface="Segoe UI Light" panose="020B0502040204020203" pitchFamily="34" charset="0"/>
+              <a:cs typeface="Segoe UI Light" panose="020B0502040204020203" pitchFamily="34" charset="0"/>
+            </a:endParaRPr>
+          </a:p>
+          <a:p>
+            <a:pPr marL="342900" indent="-342900" algn="l">
+              <a:lnSpc>
+                <a:spcPct val="150000"/>
+              </a:lnSpc>
+              <a:buClr>
+                <a:schemeClr val="accent6"/>
+              </a:buClr>
+              <a:buFont typeface="Courier New" panose="02070309020205020404" pitchFamily="49" charset="0"/>
+              <a:buChar char="o"/>
+            </a:pPr>
+            <a:r>
+              <a:rPr lang="en-US" dirty="0">
+                <a:latin typeface="Segoe UI Light" panose="020B0502040204020203" pitchFamily="34" charset="0"/>
+                <a:cs typeface="Segoe UI Light" panose="020B0502040204020203" pitchFamily="34" charset="0"/>
               </a:rPr>
-              <a:t>, developing a custom Movie Collection application, and creating the </a:t>
-            </a:r>
-            <a:r>
-              <a:rPr lang="en-US" sz="1200" b="0" i="0" dirty="0" err="1">
-                <a:solidFill>
-                  <a:srgbClr val="F2DDCC"/>
-                </a:solidFill>
-                <a:effectLst/>
-                <a:latin typeface="Ginto"/>
-              </a:rPr>
-              <a:t>RoboWarriorExtreme</a:t>
-            </a:r>
-            <a:r>
-              <a:rPr lang="en-US" sz="1200" b="0" i="0" dirty="0">
-                <a:solidFill>
-                  <a:srgbClr val="F2DDCC"/>
-                </a:solidFill>
-                <a:effectLst/>
-                <a:latin typeface="Ginto"/>
-              </a:rPr>
-              <a:t> game. Each project has been meticulously crafted to highlight specific skills such as encapsulation, conditional logic, complex </a:t>
-            </a:r>
-            <a:r>
-              <a:rPr lang="en-US" sz="1200" b="0" i="0" dirty="0" err="1">
-                <a:solidFill>
-                  <a:srgbClr val="F2DDCC"/>
-                </a:solidFill>
-                <a:effectLst/>
-                <a:latin typeface="Ginto"/>
-              </a:rPr>
-              <a:t>boolean</a:t>
-            </a:r>
-            <a:r>
-              <a:rPr lang="en-US" sz="1200" b="0" i="0" dirty="0">
-                <a:solidFill>
-                  <a:srgbClr val="F2DDCC"/>
-                </a:solidFill>
-                <a:effectLst/>
-                <a:latin typeface="Ginto"/>
-              </a:rPr>
-              <a:t> statements, loops, file reading, and method overloading. Through these projects, I aim to illustrate my proficiency in Java and my readiness to tackle real-world programming challenges.</a:t>
-            </a:r>
-            <a:endParaRPr lang="en-US" sz="1200" dirty="0"/>
+              <a:t>Ch10: Properly Implement the Comparable Interface</a:t>
+            </a:r>
+            <a:endParaRPr lang="en-US" dirty="0">
+              <a:solidFill>
+                <a:schemeClr val="bg1"/>
+              </a:solidFill>
+              <a:latin typeface="Segoe UI Light" panose="020B0502040204020203" pitchFamily="34" charset="0"/>
+              <a:cs typeface="Segoe UI Light" panose="020B0502040204020203" pitchFamily="34" charset="0"/>
+            </a:endParaRPr>
           </a:p>
         </p:txBody>
       </p:sp>
     </p:spTree>
     <p:extLst>
       <p:ext uri="{BB962C8B-B14F-4D97-AF65-F5344CB8AC3E}">
-        <p14:creationId xmlns:p14="http://schemas.microsoft.com/office/powerpoint/2010/main" val="3380759881"/>
+        <p14:creationId xmlns:p14="http://schemas.microsoft.com/office/powerpoint/2010/main" val="1768187496"/>
       </p:ext>
     </p:extLst>
   </p:cSld>
@@ -18899,6 +20528,204 @@
 </file>
 
 <file path=ppt/slides/slide5.xml><?xml version="1.0" encoding="utf-8"?>
+<p:sld xmlns:a="http://schemas.openxmlformats.org/drawingml/2006/main" xmlns:r="http://schemas.openxmlformats.org/officeDocument/2006/relationships" xmlns:p="http://schemas.openxmlformats.org/presentationml/2006/main">
+  <p:cSld>
+    <p:spTree>
+      <p:nvGrpSpPr>
+        <p:cNvPr id="1" name="">
+          <a:extLst>
+            <a:ext uri="{FF2B5EF4-FFF2-40B4-BE49-F238E27FC236}">
+              <a16:creationId xmlns:a16="http://schemas.microsoft.com/office/drawing/2014/main" id="{B4AFC000-F938-EF01-22E6-620317759B2A}"/>
+            </a:ext>
+          </a:extLst>
+        </p:cNvPr>
+        <p:cNvGrpSpPr/>
+        <p:nvPr/>
+      </p:nvGrpSpPr>
+      <p:grpSpPr>
+        <a:xfrm>
+          <a:off x="0" y="0"/>
+          <a:ext cx="0" cy="0"/>
+          <a:chOff x="0" y="0"/>
+          <a:chExt cx="0" cy="0"/>
+        </a:xfrm>
+      </p:grpSpPr>
+      <p:sp>
+        <p:nvSpPr>
+          <p:cNvPr id="2" name="Title 1">
+            <a:extLst>
+              <a:ext uri="{FF2B5EF4-FFF2-40B4-BE49-F238E27FC236}">
+                <a16:creationId xmlns:a16="http://schemas.microsoft.com/office/drawing/2014/main" id="{519C5C3A-E0C9-FBA3-E94D-61B1C64361B9}"/>
+              </a:ext>
+            </a:extLst>
+          </p:cNvPr>
+          <p:cNvSpPr>
+            <a:spLocks noGrp="1"/>
+          </p:cNvSpPr>
+          <p:nvPr>
+            <p:ph type="title"/>
+          </p:nvPr>
+        </p:nvSpPr>
+        <p:spPr/>
+        <p:txBody>
+          <a:bodyPr>
+            <a:normAutofit/>
+          </a:bodyPr>
+          <a:lstStyle/>
+          <a:p>
+            <a:r>
+              <a:rPr lang="en-US" sz="4000" b="1" spc="600" dirty="0">
+                <a:ln w="28575">
+                  <a:noFill/>
+                  <a:prstDash val="solid"/>
+                </a:ln>
+                <a:solidFill>
+                  <a:schemeClr val="bg1"/>
+                </a:solidFill>
+                <a:latin typeface="Tw Cen MT" panose="020B0602020104020603" pitchFamily="34" charset="77"/>
+              </a:rPr>
+              <a:t>CONTENTS</a:t>
+            </a:r>
+            <a:endParaRPr lang="en-US" dirty="0"/>
+          </a:p>
+        </p:txBody>
+      </p:sp>
+      <p:sp>
+        <p:nvSpPr>
+          <p:cNvPr id="3" name="Content Placeholder 2">
+            <a:extLst>
+              <a:ext uri="{FF2B5EF4-FFF2-40B4-BE49-F238E27FC236}">
+                <a16:creationId xmlns:a16="http://schemas.microsoft.com/office/drawing/2014/main" id="{6DA95E9E-65E2-DDAF-3349-A82EF6AFD657}"/>
+              </a:ext>
+            </a:extLst>
+          </p:cNvPr>
+          <p:cNvSpPr>
+            <a:spLocks noGrp="1"/>
+          </p:cNvSpPr>
+          <p:nvPr>
+            <p:ph idx="1"/>
+          </p:nvPr>
+        </p:nvSpPr>
+        <p:spPr/>
+        <p:txBody>
+          <a:bodyPr/>
+          <a:lstStyle/>
+          <a:p>
+            <a:pPr marL="342900" indent="-342900" algn="l">
+              <a:lnSpc>
+                <a:spcPct val="150000"/>
+              </a:lnSpc>
+              <a:buClr>
+                <a:schemeClr val="accent6"/>
+              </a:buClr>
+              <a:buFont typeface="Courier New" panose="02070309020205020404" pitchFamily="49" charset="0"/>
+              <a:buChar char="o"/>
+            </a:pPr>
+            <a:r>
+              <a:rPr lang="en-US" dirty="0">
+                <a:solidFill>
+                  <a:schemeClr val="bg1"/>
+                </a:solidFill>
+                <a:latin typeface="Segoe UI Light" panose="020B0502040204020203" pitchFamily="34" charset="0"/>
+                <a:cs typeface="Segoe UI Light" panose="020B0502040204020203" pitchFamily="34" charset="0"/>
+              </a:rPr>
+              <a:t>Ch11: Create a Custom Exception</a:t>
+            </a:r>
+          </a:p>
+          <a:p>
+            <a:pPr marL="342900" indent="-342900" algn="l">
+              <a:lnSpc>
+                <a:spcPct val="150000"/>
+              </a:lnSpc>
+              <a:buClr>
+                <a:schemeClr val="accent6"/>
+              </a:buClr>
+              <a:buFont typeface="Courier New" panose="02070309020205020404" pitchFamily="49" charset="0"/>
+              <a:buChar char="o"/>
+            </a:pPr>
+            <a:r>
+              <a:rPr lang="en-US" dirty="0">
+                <a:latin typeface="Segoe UI Light" panose="020B0502040204020203" pitchFamily="34" charset="0"/>
+                <a:cs typeface="Segoe UI Light" panose="020B0502040204020203" pitchFamily="34" charset="0"/>
+              </a:rPr>
+              <a:t>Ch11: Properly Implement a ‘try / catch’ statement</a:t>
+            </a:r>
+            <a:endParaRPr lang="en-US" dirty="0">
+              <a:solidFill>
+                <a:schemeClr val="bg1"/>
+              </a:solidFill>
+              <a:latin typeface="Segoe UI Light" panose="020B0502040204020203" pitchFamily="34" charset="0"/>
+              <a:cs typeface="Segoe UI Light" panose="020B0502040204020203" pitchFamily="34" charset="0"/>
+            </a:endParaRPr>
+          </a:p>
+          <a:p>
+            <a:pPr marL="342900" indent="-342900" algn="l">
+              <a:lnSpc>
+                <a:spcPct val="150000"/>
+              </a:lnSpc>
+              <a:buClr>
+                <a:schemeClr val="accent6"/>
+              </a:buClr>
+              <a:buFont typeface="Courier New" panose="02070309020205020404" pitchFamily="49" charset="0"/>
+              <a:buChar char="o"/>
+            </a:pPr>
+            <a:r>
+              <a:rPr lang="en-US" dirty="0">
+                <a:latin typeface="Segoe UI Light" panose="020B0502040204020203" pitchFamily="34" charset="0"/>
+                <a:cs typeface="Segoe UI Light" panose="020B0502040204020203" pitchFamily="34" charset="0"/>
+              </a:rPr>
+              <a:t>Ch11: Properly Write Data to File</a:t>
+            </a:r>
+            <a:endParaRPr lang="en-US" dirty="0">
+              <a:solidFill>
+                <a:schemeClr val="bg1"/>
+              </a:solidFill>
+              <a:latin typeface="Segoe UI Light" panose="020B0502040204020203" pitchFamily="34" charset="0"/>
+              <a:cs typeface="Segoe UI Light" panose="020B0502040204020203" pitchFamily="34" charset="0"/>
+            </a:endParaRPr>
+          </a:p>
+          <a:p>
+            <a:pPr marL="342900" indent="-342900" algn="l">
+              <a:lnSpc>
+                <a:spcPct val="150000"/>
+              </a:lnSpc>
+              <a:buClr>
+                <a:schemeClr val="accent6"/>
+              </a:buClr>
+              <a:buFont typeface="Courier New" panose="02070309020205020404" pitchFamily="49" charset="0"/>
+              <a:buChar char="o"/>
+            </a:pPr>
+            <a:r>
+              <a:rPr lang="en-US" dirty="0">
+                <a:latin typeface="Segoe UI Light" panose="020B0502040204020203" pitchFamily="34" charset="0"/>
+                <a:cs typeface="Segoe UI Light" panose="020B0502040204020203" pitchFamily="34" charset="0"/>
+              </a:rPr>
+              <a:t>Ch12: Display Understanding of Recursion</a:t>
+            </a:r>
+            <a:endParaRPr lang="en-US" dirty="0">
+              <a:solidFill>
+                <a:schemeClr val="bg1"/>
+              </a:solidFill>
+              <a:latin typeface="Segoe UI Light" panose="020B0502040204020203" pitchFamily="34" charset="0"/>
+              <a:cs typeface="Segoe UI Light" panose="020B0502040204020203" pitchFamily="34" charset="0"/>
+            </a:endParaRPr>
+          </a:p>
+        </p:txBody>
+      </p:sp>
+    </p:spTree>
+    <p:extLst>
+      <p:ext uri="{BB962C8B-B14F-4D97-AF65-F5344CB8AC3E}">
+        <p14:creationId xmlns:p14="http://schemas.microsoft.com/office/powerpoint/2010/main" val="4017082123"/>
+      </p:ext>
+    </p:extLst>
+  </p:cSld>
+  <p:clrMapOvr>
+    <a:masterClrMapping/>
+  </p:clrMapOvr>
+</p:sld>
+</file>
+
+<file path=ppt/slides/slide6.xml><?xml version="1.0" encoding="utf-8"?>
 <p:sld xmlns:a="http://schemas.openxmlformats.org/drawingml/2006/main" xmlns:r="http://schemas.openxmlformats.org/officeDocument/2006/relationships" xmlns:p="http://schemas.openxmlformats.org/presentationml/2006/main">
   <p:cSld>
     <p:spTree>
@@ -18920,6 +20747,183 @@
           <p:cNvPr id="2" name="Title 1">
             <a:extLst>
               <a:ext uri="{FF2B5EF4-FFF2-40B4-BE49-F238E27FC236}">
+                <a16:creationId xmlns:a16="http://schemas.microsoft.com/office/drawing/2014/main" id="{F41F0E99-07CC-9576-AFD7-C52151AD0EA3}"/>
+              </a:ext>
+            </a:extLst>
+          </p:cNvPr>
+          <p:cNvSpPr>
+            <a:spLocks noGrp="1"/>
+          </p:cNvSpPr>
+          <p:nvPr>
+            <p:ph type="ctrTitle"/>
+          </p:nvPr>
+        </p:nvSpPr>
+        <p:spPr>
+          <a:xfrm>
+            <a:off x="2228088" y="1798389"/>
+            <a:ext cx="7735824" cy="1069848"/>
+          </a:xfrm>
+        </p:spPr>
+        <p:txBody>
+          <a:bodyPr/>
+          <a:lstStyle/>
+          <a:p>
+            <a:r>
+              <a:rPr lang="en-US" dirty="0"/>
+              <a:t>INTRODUCTION</a:t>
+            </a:r>
+          </a:p>
+        </p:txBody>
+      </p:sp>
+      <p:sp>
+        <p:nvSpPr>
+          <p:cNvPr id="3" name="Subtitle 2">
+            <a:extLst>
+              <a:ext uri="{FF2B5EF4-FFF2-40B4-BE49-F238E27FC236}">
+                <a16:creationId xmlns:a16="http://schemas.microsoft.com/office/drawing/2014/main" id="{5A82A8B0-333F-633E-3FA7-D38DBFB10971}"/>
+              </a:ext>
+            </a:extLst>
+          </p:cNvPr>
+          <p:cNvSpPr>
+            <a:spLocks noGrp="1"/>
+          </p:cNvSpPr>
+          <p:nvPr>
+            <p:ph type="subTitle" idx="1"/>
+          </p:nvPr>
+        </p:nvSpPr>
+        <p:spPr>
+          <a:xfrm>
+            <a:off x="2057554" y="3658988"/>
+            <a:ext cx="8076892" cy="1909606"/>
+          </a:xfrm>
+        </p:spPr>
+        <p:txBody>
+          <a:bodyPr/>
+          <a:lstStyle/>
+          <a:p>
+            <a:pPr algn="l"/>
+            <a:r>
+              <a:rPr lang="en-US" sz="1200" b="0" i="0" dirty="0">
+                <a:solidFill>
+                  <a:srgbClr val="F2DDCC"/>
+                </a:solidFill>
+                <a:effectLst/>
+                <a:latin typeface="Ginto"/>
+              </a:rPr>
+              <a:t>Welcome to my project portfolio, a comprehensive showcase of my journey through essential Java programming concepts and techniques. As a college student deeply invested in mastering software development, I have created a series of projects that not only satisfy my portfolio requirements but also demonstrate my ability to apply theoretical knowledge to practical scenarios.</a:t>
+            </a:r>
+          </a:p>
+          <a:p>
+            <a:pPr algn="l"/>
+            <a:r>
+              <a:rPr lang="en-US" sz="1200" b="0" i="0" dirty="0">
+                <a:solidFill>
+                  <a:srgbClr val="F2DDCC"/>
+                </a:solidFill>
+                <a:effectLst/>
+                <a:latin typeface="Ginto"/>
+              </a:rPr>
+              <a:t>This portfolio includes five key projects: printing data to the console, performing mathematical operations, parsing strings and utilizing </a:t>
+            </a:r>
+            <a:r>
+              <a:rPr lang="en-US" sz="1200" b="0" i="0" dirty="0" err="1">
+                <a:solidFill>
+                  <a:srgbClr val="F2DDCC"/>
+                </a:solidFill>
+                <a:effectLst/>
+                <a:latin typeface="Ginto"/>
+              </a:rPr>
+              <a:t>enums</a:t>
+            </a:r>
+            <a:r>
+              <a:rPr lang="en-US" sz="1200" b="0" i="0" dirty="0">
+                <a:solidFill>
+                  <a:srgbClr val="F2DDCC"/>
+                </a:solidFill>
+                <a:effectLst/>
+                <a:latin typeface="Ginto"/>
+              </a:rPr>
+              <a:t>, developing a custom Movie Collection application, and creating the </a:t>
+            </a:r>
+            <a:r>
+              <a:rPr lang="en-US" sz="1200" b="0" i="0" dirty="0" err="1">
+                <a:solidFill>
+                  <a:srgbClr val="F2DDCC"/>
+                </a:solidFill>
+                <a:effectLst/>
+                <a:latin typeface="Ginto"/>
+              </a:rPr>
+              <a:t>RoboWarriorExtreme</a:t>
+            </a:r>
+            <a:r>
+              <a:rPr lang="en-US" sz="1200" b="0" i="0" dirty="0">
+                <a:solidFill>
+                  <a:srgbClr val="F2DDCC"/>
+                </a:solidFill>
+                <a:effectLst/>
+                <a:latin typeface="Ginto"/>
+              </a:rPr>
+              <a:t> game. Each project has been meticulously crafted to highlight specific skills such as encapsulation, conditional logic, complex </a:t>
+            </a:r>
+            <a:r>
+              <a:rPr lang="en-US" sz="1200" b="0" i="0" dirty="0" err="1">
+                <a:solidFill>
+                  <a:srgbClr val="F2DDCC"/>
+                </a:solidFill>
+                <a:effectLst/>
+                <a:latin typeface="Ginto"/>
+              </a:rPr>
+              <a:t>boolean</a:t>
+            </a:r>
+            <a:r>
+              <a:rPr lang="en-US" sz="1200" b="0" i="0" dirty="0">
+                <a:solidFill>
+                  <a:srgbClr val="F2DDCC"/>
+                </a:solidFill>
+                <a:effectLst/>
+                <a:latin typeface="Ginto"/>
+              </a:rPr>
+              <a:t> statements, loops, file reading, and method overloading. Through these projects, I aim to illustrate my proficiency in Java and my readiness to tackle real-world programming challenges.</a:t>
+            </a:r>
+            <a:endParaRPr lang="en-US" sz="1200" dirty="0"/>
+          </a:p>
+        </p:txBody>
+      </p:sp>
+    </p:spTree>
+    <p:extLst>
+      <p:ext uri="{BB962C8B-B14F-4D97-AF65-F5344CB8AC3E}">
+        <p14:creationId xmlns:p14="http://schemas.microsoft.com/office/powerpoint/2010/main" val="3380759881"/>
+      </p:ext>
+    </p:extLst>
+  </p:cSld>
+  <p:clrMapOvr>
+    <a:masterClrMapping/>
+  </p:clrMapOvr>
+</p:sld>
+</file>
+
+<file path=ppt/slides/slide7.xml><?xml version="1.0" encoding="utf-8"?>
+<p:sld xmlns:a="http://schemas.openxmlformats.org/drawingml/2006/main" xmlns:r="http://schemas.openxmlformats.org/officeDocument/2006/relationships" xmlns:p="http://schemas.openxmlformats.org/presentationml/2006/main">
+  <p:cSld>
+    <p:spTree>
+      <p:nvGrpSpPr>
+        <p:cNvPr id="1" name=""/>
+        <p:cNvGrpSpPr/>
+        <p:nvPr/>
+      </p:nvGrpSpPr>
+      <p:grpSpPr>
+        <a:xfrm>
+          <a:off x="0" y="0"/>
+          <a:ext cx="0" cy="0"/>
+          <a:chOff x="0" y="0"/>
+          <a:chExt cx="0" cy="0"/>
+        </a:xfrm>
+      </p:grpSpPr>
+      <p:sp>
+        <p:nvSpPr>
+          <p:cNvPr id="2" name="Title 1">
+            <a:extLst>
+              <a:ext uri="{FF2B5EF4-FFF2-40B4-BE49-F238E27FC236}">
                 <a16:creationId xmlns:a16="http://schemas.microsoft.com/office/drawing/2014/main" id="{D249E45E-D6A7-9780-F652-BAF86DFBCC00}"/>
               </a:ext>
             </a:extLst>
@@ -18999,7 +21003,7 @@
         </p:nvSpPr>
         <p:spPr>
           <a:xfrm>
-            <a:off x="1545336" y="2641600"/>
+            <a:off x="1436115" y="2574365"/>
             <a:ext cx="3621024" cy="2578608"/>
           </a:xfrm>
         </p:spPr>
@@ -19015,15 +21019,15 @@
           <a:p>
             <a:pPr lvl="1"/>
             <a:r>
-              <a:rPr lang="en-US" sz="1000" dirty="0"/>
+              <a:rPr lang="en-US" sz="1200" dirty="0"/>
               <a:t>Use ‘</a:t>
             </a:r>
             <a:r>
-              <a:rPr lang="en-US" sz="1000" dirty="0" err="1"/>
+              <a:rPr lang="en-US" sz="1200" dirty="0" err="1"/>
               <a:t>System.out.println</a:t>
             </a:r>
             <a:r>
-              <a:rPr lang="en-US" sz="1000" dirty="0"/>
+              <a:rPr lang="en-US" sz="1200" dirty="0"/>
               <a:t>(“What You Want to Print”);’ to print text to the console in Java.</a:t>
             </a:r>
           </a:p>
@@ -19036,15 +21040,15 @@
           <a:p>
             <a:pPr lvl="1"/>
             <a:r>
-              <a:rPr lang="en-US" sz="1000" dirty="0"/>
+              <a:rPr lang="en-US" sz="1200" dirty="0"/>
               <a:t>I wrote a few comments, more are in the </a:t>
             </a:r>
             <a:r>
-              <a:rPr lang="en-US" sz="1000" dirty="0" err="1"/>
+              <a:rPr lang="en-US" sz="1200" dirty="0" err="1"/>
               <a:t>BasicPortfolio</a:t>
             </a:r>
             <a:r>
-              <a:rPr lang="en-US" sz="1000" dirty="0"/>
+              <a:rPr lang="en-US" sz="1200" dirty="0"/>
               <a:t> class.</a:t>
             </a:r>
           </a:p>
@@ -19093,7 +21097,7 @@
 </p:sld>
 </file>
 
-<file path=ppt/slides/slide6.xml><?xml version="1.0" encoding="utf-8"?>
+<file path=ppt/slides/slide8.xml><?xml version="1.0" encoding="utf-8"?>
 <p:sld xmlns:a="http://schemas.openxmlformats.org/drawingml/2006/main" xmlns:r="http://schemas.openxmlformats.org/officeDocument/2006/relationships" xmlns:p="http://schemas.openxmlformats.org/presentationml/2006/main">
   <p:cSld>
     <p:spTree>
@@ -19216,7 +21220,7 @@
           <a:p>
             <a:pPr lvl="1"/>
             <a:r>
-              <a:rPr lang="en-US" sz="1000" dirty="0"/>
+              <a:rPr lang="en-US" sz="1200" dirty="0"/>
               <a:t>I declared variables as ‘int’, which means they are integers.</a:t>
             </a:r>
           </a:p>
@@ -19229,7 +21233,7 @@
           <a:p>
             <a:pPr lvl="1"/>
             <a:r>
-              <a:rPr lang="en-US" sz="1000" dirty="0"/>
+              <a:rPr lang="en-US" sz="1200" dirty="0"/>
               <a:t>I manually cast a double, ‘myDouble2’ to an integer.</a:t>
             </a:r>
           </a:p>
@@ -19278,7 +21282,7 @@
 </p:sld>
 </file>
 
-<file path=ppt/slides/slide7.xml><?xml version="1.0" encoding="utf-8"?>
+<file path=ppt/slides/slide9.xml><?xml version="1.0" encoding="utf-8"?>
 <p:sld xmlns:a="http://schemas.openxmlformats.org/drawingml/2006/main" xmlns:r="http://schemas.openxmlformats.org/officeDocument/2006/relationships" xmlns:p="http://schemas.openxmlformats.org/presentationml/2006/main">
   <p:cSld>
     <p:spTree>
@@ -19401,15 +21405,15 @@
           <a:p>
             <a:pPr lvl="1"/>
             <a:r>
-              <a:rPr lang="en-US" sz="1000" dirty="0"/>
+              <a:rPr lang="en-US" sz="1200" dirty="0"/>
               <a:t>Using the .</a:t>
             </a:r>
             <a:r>
-              <a:rPr lang="en-US" sz="1000" dirty="0" err="1"/>
+              <a:rPr lang="en-US" sz="1200" dirty="0" err="1"/>
               <a:t>parseInt</a:t>
             </a:r>
             <a:r>
-              <a:rPr lang="en-US" sz="1000" dirty="0"/>
+              <a:rPr lang="en-US" sz="1200" dirty="0"/>
               <a:t>() method provided in Java.</a:t>
             </a:r>
           </a:p>
@@ -19422,23 +21426,23 @@
           <a:p>
             <a:pPr lvl="1"/>
             <a:r>
-              <a:rPr lang="en-US" sz="1000" dirty="0"/>
+              <a:rPr lang="en-US" sz="1200" dirty="0"/>
               <a:t>We use both the </a:t>
             </a:r>
             <a:r>
-              <a:rPr lang="en-US" sz="1000" dirty="0" err="1"/>
+              <a:rPr lang="en-US" sz="1200" dirty="0" err="1"/>
               <a:t>Math.PI</a:t>
             </a:r>
             <a:r>
-              <a:rPr lang="en-US" sz="1000" dirty="0"/>
+              <a:rPr lang="en-US" sz="1200" dirty="0"/>
               <a:t> and </a:t>
             </a:r>
             <a:r>
-              <a:rPr lang="en-US" sz="1000" dirty="0" err="1"/>
+              <a:rPr lang="en-US" sz="1200" dirty="0" err="1"/>
               <a:t>Math.pow</a:t>
             </a:r>
             <a:r>
-              <a:rPr lang="en-US" sz="1000" dirty="0"/>
+              <a:rPr lang="en-US" sz="1200" dirty="0"/>
               <a:t> libraries.</a:t>
             </a:r>
           </a:p>
@@ -19488,434 +21492,6 @@
     <p:extLst>
       <p:ext uri="{BB962C8B-B14F-4D97-AF65-F5344CB8AC3E}">
         <p14:creationId xmlns:p14="http://schemas.microsoft.com/office/powerpoint/2010/main" val="985905699"/>
-      </p:ext>
-    </p:extLst>
-  </p:cSld>
-  <p:clrMapOvr>
-    <a:masterClrMapping/>
-  </p:clrMapOvr>
-</p:sld>
-</file>
-
-<file path=ppt/slides/slide8.xml><?xml version="1.0" encoding="utf-8"?>
-<p:sld xmlns:a="http://schemas.openxmlformats.org/drawingml/2006/main" xmlns:r="http://schemas.openxmlformats.org/officeDocument/2006/relationships" xmlns:p="http://schemas.openxmlformats.org/presentationml/2006/main">
-  <p:cSld>
-    <p:spTree>
-      <p:nvGrpSpPr>
-        <p:cNvPr id="1" name="">
-          <a:extLst>
-            <a:ext uri="{FF2B5EF4-FFF2-40B4-BE49-F238E27FC236}">
-              <a16:creationId xmlns:a16="http://schemas.microsoft.com/office/drawing/2014/main" id="{096E4B74-7D7C-6928-0B22-E8FF5A86FCF4}"/>
-            </a:ext>
-          </a:extLst>
-        </p:cNvPr>
-        <p:cNvGrpSpPr/>
-        <p:nvPr/>
-      </p:nvGrpSpPr>
-      <p:grpSpPr>
-        <a:xfrm>
-          <a:off x="0" y="0"/>
-          <a:ext cx="0" cy="0"/>
-          <a:chOff x="0" y="0"/>
-          <a:chExt cx="0" cy="0"/>
-        </a:xfrm>
-      </p:grpSpPr>
-      <p:sp>
-        <p:nvSpPr>
-          <p:cNvPr id="2" name="Title 1">
-            <a:extLst>
-              <a:ext uri="{FF2B5EF4-FFF2-40B4-BE49-F238E27FC236}">
-                <a16:creationId xmlns:a16="http://schemas.microsoft.com/office/drawing/2014/main" id="{095BD950-221D-B6DB-918A-9C88F3CFD60B}"/>
-              </a:ext>
-            </a:extLst>
-          </p:cNvPr>
-          <p:cNvSpPr>
-            <a:spLocks noGrp="1"/>
-          </p:cNvSpPr>
-          <p:nvPr>
-            <p:ph type="title"/>
-          </p:nvPr>
-        </p:nvSpPr>
-        <p:spPr>
-          <a:xfrm>
-            <a:off x="1231300" y="608076"/>
-            <a:ext cx="9167229" cy="1069848"/>
-          </a:xfrm>
-        </p:spPr>
-        <p:txBody>
-          <a:bodyPr/>
-          <a:lstStyle/>
-          <a:p>
-            <a:r>
-              <a:rPr lang="en-US" sz="3600" dirty="0"/>
-              <a:t>Project 03b: Utilizing </a:t>
-            </a:r>
-            <a:r>
-              <a:rPr lang="en-US" sz="3600" dirty="0" err="1"/>
-              <a:t>enums</a:t>
-            </a:r>
-            <a:endParaRPr lang="en-US" sz="3600" dirty="0"/>
-          </a:p>
-        </p:txBody>
-      </p:sp>
-      <p:sp>
-        <p:nvSpPr>
-          <p:cNvPr id="5" name="Text Placeholder 4">
-            <a:extLst>
-              <a:ext uri="{FF2B5EF4-FFF2-40B4-BE49-F238E27FC236}">
-                <a16:creationId xmlns:a16="http://schemas.microsoft.com/office/drawing/2014/main" id="{11B1C109-FCBB-309B-27EA-89AA8C076C58}"/>
-              </a:ext>
-            </a:extLst>
-          </p:cNvPr>
-          <p:cNvSpPr>
-            <a:spLocks noGrp="1"/>
-          </p:cNvSpPr>
-          <p:nvPr>
-            <p:ph type="body" sz="quarter" idx="3"/>
-          </p:nvPr>
-        </p:nvSpPr>
-        <p:spPr>
-          <a:xfrm>
-            <a:off x="1545336" y="2020824"/>
-            <a:ext cx="3621024" cy="493776"/>
-          </a:xfrm>
-        </p:spPr>
-        <p:txBody>
-          <a:bodyPr/>
-          <a:lstStyle/>
-          <a:p>
-            <a:r>
-              <a:rPr lang="en-US" dirty="0"/>
-              <a:t>Goals: </a:t>
-            </a:r>
-          </a:p>
-        </p:txBody>
-      </p:sp>
-      <p:sp>
-        <p:nvSpPr>
-          <p:cNvPr id="6" name="Content Placeholder 5">
-            <a:extLst>
-              <a:ext uri="{FF2B5EF4-FFF2-40B4-BE49-F238E27FC236}">
-                <a16:creationId xmlns:a16="http://schemas.microsoft.com/office/drawing/2014/main" id="{26664FC2-9C62-AFE7-F054-1346D6606EE6}"/>
-              </a:ext>
-            </a:extLst>
-          </p:cNvPr>
-          <p:cNvSpPr>
-            <a:spLocks noGrp="1"/>
-          </p:cNvSpPr>
-          <p:nvPr>
-            <p:ph sz="quarter" idx="4"/>
-          </p:nvPr>
-        </p:nvSpPr>
-        <p:spPr>
-          <a:xfrm>
-            <a:off x="1231300" y="2560319"/>
-            <a:ext cx="3621024" cy="2578608"/>
-          </a:xfrm>
-        </p:spPr>
-        <p:txBody>
-          <a:bodyPr/>
-          <a:lstStyle/>
-          <a:p>
-            <a:r>
-              <a:rPr lang="en-US" sz="1200" dirty="0"/>
-              <a:t>Properly define and utilize an </a:t>
-            </a:r>
-            <a:r>
-              <a:rPr lang="en-US" sz="1200" dirty="0" err="1"/>
-              <a:t>enum</a:t>
-            </a:r>
-            <a:r>
-              <a:rPr lang="en-US" sz="1200" dirty="0"/>
-              <a:t>.</a:t>
-            </a:r>
-          </a:p>
-          <a:p>
-            <a:pPr lvl="1"/>
-            <a:r>
-              <a:rPr lang="en-US" sz="1000" dirty="0"/>
-              <a:t>I created and use an ‘</a:t>
-            </a:r>
-            <a:r>
-              <a:rPr lang="en-US" sz="1000" dirty="0" err="1"/>
-              <a:t>enum</a:t>
-            </a:r>
-            <a:r>
-              <a:rPr lang="en-US" sz="1000" dirty="0"/>
-              <a:t>’ named Burgers, which contains multiple Burger types that are available.</a:t>
-            </a:r>
-          </a:p>
-          <a:p>
-            <a:r>
-              <a:rPr lang="en-US" sz="1200" dirty="0"/>
-              <a:t>I also use the Java ‘Scanner’ </a:t>
-            </a:r>
-          </a:p>
-          <a:p>
-            <a:pPr lvl="1"/>
-            <a:r>
-              <a:rPr lang="en-US" sz="1000" dirty="0"/>
-              <a:t>In my scanner I make certain it transforms the input into all uppercase to match my </a:t>
-            </a:r>
-            <a:r>
-              <a:rPr lang="en-US" sz="1000" dirty="0" err="1"/>
-              <a:t>enum</a:t>
-            </a:r>
-            <a:r>
-              <a:rPr lang="en-US" sz="1000" dirty="0"/>
-              <a:t> contents.</a:t>
-            </a:r>
-          </a:p>
-          <a:p>
-            <a:r>
-              <a:rPr lang="en-US" sz="1200" dirty="0"/>
-              <a:t>This project makes use of a ‘switch’ statement.</a:t>
-            </a:r>
-          </a:p>
-          <a:p>
-            <a:pPr lvl="1"/>
-            <a:endParaRPr lang="en-US" sz="1000" dirty="0"/>
-          </a:p>
-          <a:p>
-            <a:pPr lvl="1"/>
-            <a:endParaRPr lang="en-US" sz="1000" dirty="0"/>
-          </a:p>
-        </p:txBody>
-      </p:sp>
-      <p:pic>
-        <p:nvPicPr>
-          <p:cNvPr id="11" name="Picture 10" descr="A screenshot of a computer program&#10;&#10;Description automatically generated">
-            <a:extLst>
-              <a:ext uri="{FF2B5EF4-FFF2-40B4-BE49-F238E27FC236}">
-                <a16:creationId xmlns:a16="http://schemas.microsoft.com/office/drawing/2014/main" id="{B4F49C30-2F53-DCA0-FBA6-A23DB90529EE}"/>
-              </a:ext>
-            </a:extLst>
-          </p:cNvPr>
-          <p:cNvPicPr>
-            <a:picLocks noChangeAspect="1"/>
-          </p:cNvPicPr>
-          <p:nvPr/>
-        </p:nvPicPr>
-        <p:blipFill>
-          <a:blip r:embed="rId2"/>
-          <a:stretch>
-            <a:fillRect/>
-          </a:stretch>
-        </p:blipFill>
-        <p:spPr>
-          <a:xfrm>
-            <a:off x="5016875" y="1791853"/>
-            <a:ext cx="6978178" cy="4687455"/>
-          </a:xfrm>
-          <a:prstGeom prst="rect">
-            <a:avLst/>
-          </a:prstGeom>
-        </p:spPr>
-      </p:pic>
-    </p:spTree>
-    <p:extLst>
-      <p:ext uri="{BB962C8B-B14F-4D97-AF65-F5344CB8AC3E}">
-        <p14:creationId xmlns:p14="http://schemas.microsoft.com/office/powerpoint/2010/main" val="631271878"/>
-      </p:ext>
-    </p:extLst>
-  </p:cSld>
-  <p:clrMapOvr>
-    <a:masterClrMapping/>
-  </p:clrMapOvr>
-</p:sld>
-</file>
-
-<file path=ppt/slides/slide9.xml><?xml version="1.0" encoding="utf-8"?>
-<p:sld xmlns:a="http://schemas.openxmlformats.org/drawingml/2006/main" xmlns:r="http://schemas.openxmlformats.org/officeDocument/2006/relationships" xmlns:p="http://schemas.openxmlformats.org/presentationml/2006/main">
-  <p:cSld>
-    <p:spTree>
-      <p:nvGrpSpPr>
-        <p:cNvPr id="1" name="">
-          <a:extLst>
-            <a:ext uri="{FF2B5EF4-FFF2-40B4-BE49-F238E27FC236}">
-              <a16:creationId xmlns:a16="http://schemas.microsoft.com/office/drawing/2014/main" id="{7A7E5445-CA12-E946-C50E-821177B5FDD8}"/>
-            </a:ext>
-          </a:extLst>
-        </p:cNvPr>
-        <p:cNvGrpSpPr/>
-        <p:nvPr/>
-      </p:nvGrpSpPr>
-      <p:grpSpPr>
-        <a:xfrm>
-          <a:off x="0" y="0"/>
-          <a:ext cx="0" cy="0"/>
-          <a:chOff x="0" y="0"/>
-          <a:chExt cx="0" cy="0"/>
-        </a:xfrm>
-      </p:grpSpPr>
-      <p:sp>
-        <p:nvSpPr>
-          <p:cNvPr id="2" name="Title 1">
-            <a:extLst>
-              <a:ext uri="{FF2B5EF4-FFF2-40B4-BE49-F238E27FC236}">
-                <a16:creationId xmlns:a16="http://schemas.microsoft.com/office/drawing/2014/main" id="{5CB309E0-A0EC-0279-DCBB-93706C6E1E1E}"/>
-              </a:ext>
-            </a:extLst>
-          </p:cNvPr>
-          <p:cNvSpPr>
-            <a:spLocks noGrp="1"/>
-          </p:cNvSpPr>
-          <p:nvPr>
-            <p:ph type="title"/>
-          </p:nvPr>
-        </p:nvSpPr>
-        <p:spPr>
-          <a:xfrm>
-            <a:off x="1231300" y="608076"/>
-            <a:ext cx="9167229" cy="1069848"/>
-          </a:xfrm>
-        </p:spPr>
-        <p:txBody>
-          <a:bodyPr/>
-          <a:lstStyle/>
-          <a:p>
-            <a:r>
-              <a:rPr lang="en-US" sz="2800" dirty="0"/>
-              <a:t>Project 04: Custom Class, Encapsulation, Read data from Scanner</a:t>
-            </a:r>
-          </a:p>
-        </p:txBody>
-      </p:sp>
-      <p:sp>
-        <p:nvSpPr>
-          <p:cNvPr id="5" name="Text Placeholder 4">
-            <a:extLst>
-              <a:ext uri="{FF2B5EF4-FFF2-40B4-BE49-F238E27FC236}">
-                <a16:creationId xmlns:a16="http://schemas.microsoft.com/office/drawing/2014/main" id="{22564BB5-5D3B-430C-017E-20E568806296}"/>
-              </a:ext>
-            </a:extLst>
-          </p:cNvPr>
-          <p:cNvSpPr>
-            <a:spLocks noGrp="1"/>
-          </p:cNvSpPr>
-          <p:nvPr>
-            <p:ph type="body" sz="quarter" idx="3"/>
-          </p:nvPr>
-        </p:nvSpPr>
-        <p:spPr>
-          <a:xfrm>
-            <a:off x="1231300" y="1778506"/>
-            <a:ext cx="3621024" cy="493776"/>
-          </a:xfrm>
-        </p:spPr>
-        <p:txBody>
-          <a:bodyPr/>
-          <a:lstStyle/>
-          <a:p>
-            <a:r>
-              <a:rPr lang="en-US" dirty="0"/>
-              <a:t>Goals: </a:t>
-            </a:r>
-          </a:p>
-        </p:txBody>
-      </p:sp>
-      <p:sp>
-        <p:nvSpPr>
-          <p:cNvPr id="6" name="Content Placeholder 5">
-            <a:extLst>
-              <a:ext uri="{FF2B5EF4-FFF2-40B4-BE49-F238E27FC236}">
-                <a16:creationId xmlns:a16="http://schemas.microsoft.com/office/drawing/2014/main" id="{8849371D-DA57-1968-E868-2BC49FED8232}"/>
-              </a:ext>
-            </a:extLst>
-          </p:cNvPr>
-          <p:cNvSpPr>
-            <a:spLocks noGrp="1"/>
-          </p:cNvSpPr>
-          <p:nvPr>
-            <p:ph sz="quarter" idx="4"/>
-          </p:nvPr>
-        </p:nvSpPr>
-        <p:spPr>
-          <a:xfrm>
-            <a:off x="1166645" y="2272282"/>
-            <a:ext cx="3621024" cy="3221645"/>
-          </a:xfrm>
-        </p:spPr>
-        <p:txBody>
-          <a:bodyPr/>
-          <a:lstStyle/>
-          <a:p>
-            <a:r>
-              <a:rPr lang="en-US" sz="1200" dirty="0"/>
-              <a:t>Movie is an object class that contains private fields of what we use to classify our ‘movie’.</a:t>
-            </a:r>
-          </a:p>
-          <a:p>
-            <a:pPr lvl="1"/>
-            <a:r>
-              <a:rPr lang="en-US" sz="1000" dirty="0"/>
-              <a:t>We access the ‘private’ content of our object by creating public ‘getters and setters’ that can return information about the object, or transform that object.</a:t>
-            </a:r>
-          </a:p>
-          <a:p>
-            <a:r>
-              <a:rPr lang="en-US" sz="1200" dirty="0"/>
-              <a:t>Keeping the internal aspects of the object ‘private’ and using the ‘getters and setters’ is an example of encapsulation.</a:t>
-            </a:r>
-          </a:p>
-          <a:p>
-            <a:r>
-              <a:rPr lang="en-US" sz="1200" dirty="0"/>
-              <a:t>We again have a scanner that takes user input and stores that information for use in our </a:t>
-            </a:r>
-            <a:r>
-              <a:rPr lang="en-US" sz="1200" dirty="0" err="1"/>
-              <a:t>ArrayList</a:t>
-            </a:r>
-            <a:r>
-              <a:rPr lang="en-US" sz="1200" dirty="0"/>
-              <a:t>.</a:t>
-            </a:r>
-          </a:p>
-          <a:p>
-            <a:pPr lvl="1"/>
-            <a:endParaRPr lang="en-US" sz="1000" dirty="0"/>
-          </a:p>
-          <a:p>
-            <a:pPr lvl="1"/>
-            <a:endParaRPr lang="en-US" sz="1000" dirty="0"/>
-          </a:p>
-        </p:txBody>
-      </p:sp>
-      <p:pic>
-        <p:nvPicPr>
-          <p:cNvPr id="10" name="Picture 9" descr="A screenshot of a computer program&#10;&#10;Description automatically generated">
-            <a:extLst>
-              <a:ext uri="{FF2B5EF4-FFF2-40B4-BE49-F238E27FC236}">
-                <a16:creationId xmlns:a16="http://schemas.microsoft.com/office/drawing/2014/main" id="{913C8957-2309-9583-08C9-DBB4D2C26561}"/>
-              </a:ext>
-            </a:extLst>
-          </p:cNvPr>
-          <p:cNvPicPr>
-            <a:picLocks noChangeAspect="1"/>
-          </p:cNvPicPr>
-          <p:nvPr/>
-        </p:nvPicPr>
-        <p:blipFill>
-          <a:blip r:embed="rId2"/>
-          <a:stretch>
-            <a:fillRect/>
-          </a:stretch>
-        </p:blipFill>
-        <p:spPr>
-          <a:xfrm>
-            <a:off x="4852324" y="1677924"/>
-            <a:ext cx="7339504" cy="4742873"/>
-          </a:xfrm>
-          <a:prstGeom prst="rect">
-            <a:avLst/>
-          </a:prstGeom>
-        </p:spPr>
-      </p:pic>
-    </p:spTree>
-    <p:extLst>
-      <p:ext uri="{BB962C8B-B14F-4D97-AF65-F5344CB8AC3E}">
-        <p14:creationId xmlns:p14="http://schemas.microsoft.com/office/powerpoint/2010/main" val="1486838747"/>
       </p:ext>
     </p:extLst>
   </p:cSld>
@@ -20422,15 +21998,6 @@
 </file>
 
 <file path=customXml/item1.xml><?xml version="1.0" encoding="utf-8"?>
-<?mso-contentType ?>
-<FormTemplates xmlns="http://schemas.microsoft.com/sharepoint/v3/contenttype/forms">
-  <Display>DocumentLibraryForm</Display>
-  <Edit>DocumentLibraryForm</Edit>
-  <New>DocumentLibraryForm</New>
-</FormTemplates>
-</file>
-
-<file path=customXml/item2.xml><?xml version="1.0" encoding="utf-8"?>
 <ct:contentTypeSchema xmlns:ct="http://schemas.microsoft.com/office/2006/metadata/contentType" xmlns:ma="http://schemas.microsoft.com/office/2006/metadata/properties/metaAttributes" ct:_="" ma:_="" ma:contentTypeName="Document" ma:contentTypeID="0x01010079F111ED35F8CC479449609E8A0923A6" ma:contentTypeVersion="25" ma:contentTypeDescription="Create a new document." ma:contentTypeScope="" ma:versionID="e02306daf00165b375dc6a58966960be">
   <xsd:schema xmlns:xsd="http://www.w3.org/2001/XMLSchema" xmlns:xs="http://www.w3.org/2001/XMLSchema" xmlns:p="http://schemas.microsoft.com/office/2006/metadata/properties" xmlns:ns1="http://schemas.microsoft.com/sharepoint/v3" xmlns:ns2="71af3243-3dd4-4a8d-8c0d-dd76da1f02a5" xmlns:ns3="16c05727-aa75-4e4a-9b5f-8a80a1165891" xmlns:ns4="230e9df3-be65-4c73-a93b-d1236ebd677e" targetNamespace="http://schemas.microsoft.com/office/2006/metadata/properties" ma:root="true" ma:fieldsID="df88fb76bf5f555224557953949c1ec9" ns1:_="" ns2:_="" ns3:_="" ns4:_="">
     <xsd:import namespace="http://schemas.microsoft.com/sharepoint/v3"/>
@@ -20724,6 +22291,15 @@
 </ct:contentTypeSchema>
 </file>
 
+<file path=customXml/item2.xml><?xml version="1.0" encoding="utf-8"?>
+<?mso-contentType ?>
+<FormTemplates xmlns="http://schemas.microsoft.com/sharepoint/v3/contenttype/forms">
+  <Display>DocumentLibraryForm</Display>
+  <Edit>DocumentLibraryForm</Edit>
+  <New>DocumentLibraryForm</New>
+</FormTemplates>
+</file>
+
 <file path=customXml/item3.xml><?xml version="1.0" encoding="utf-8"?>
 <p:properties xmlns:p="http://schemas.microsoft.com/office/2006/metadata/properties" xmlns:xsi="http://www.w3.org/2001/XMLSchema-instance" xmlns:pc="http://schemas.microsoft.com/office/infopath/2007/PartnerControls">
   <documentManagement>
@@ -20745,14 +22321,6 @@
 </file>
 
 <file path=customXml/itemProps1.xml><?xml version="1.0" encoding="utf-8"?>
-<ds:datastoreItem xmlns:ds="http://schemas.openxmlformats.org/officeDocument/2006/customXml" ds:itemID="{4F1F1912-3146-44AF-A389-9E8B77BB3688}">
-  <ds:schemaRefs>
-    <ds:schemaRef ds:uri="http://schemas.microsoft.com/sharepoint/v3/contenttype/forms"/>
-  </ds:schemaRefs>
-</ds:datastoreItem>
-</file>
-
-<file path=customXml/itemProps2.xml><?xml version="1.0" encoding="utf-8"?>
 <ds:datastoreItem xmlns:ds="http://schemas.openxmlformats.org/officeDocument/2006/customXml" ds:itemID="{176493A3-2B83-4E58-86AD-56A2F2A20F12}">
   <ds:schemaRefs>
     <ds:schemaRef ds:uri="http://schemas.microsoft.com/office/2006/metadata/contentType"/>
@@ -20769,6 +22337,14 @@
     <ds:schemaRef ds:uri="http://purl.org/dc/elements/1.1/"/>
     <ds:schemaRef ds:uri="http://purl.org/dc/terms/"/>
     <ds:schemaRef ds:uri="http://schemas.microsoft.com/internal/obd"/>
+  </ds:schemaRefs>
+</ds:datastoreItem>
+</file>
+
+<file path=customXml/itemProps2.xml><?xml version="1.0" encoding="utf-8"?>
+<ds:datastoreItem xmlns:ds="http://schemas.openxmlformats.org/officeDocument/2006/customXml" ds:itemID="{4F1F1912-3146-44AF-A389-9E8B77BB3688}">
+  <ds:schemaRefs>
+    <ds:schemaRef ds:uri="http://schemas.microsoft.com/sharepoint/v3/contenttype/forms"/>
   </ds:schemaRefs>
 </ds:datastoreItem>
 </file>

</xml_diff>